<commit_message>
ppt. Need to finalize
</commit_message>
<xml_diff>
--- a/presentations/Sprint 1.pptx
+++ b/presentations/Sprint 1.pptx
@@ -114,6 +114,11 @@
       </a:defRPr>
     </a:lvl9pPr>
   </p:defaultTextStyle>
+  <p:extLst>
+    <p:ext uri="{EFAFB233-063F-42B5-8137-9DF3F51BA10A}">
+      <p15:sldGuideLst xmlns:p15="http://schemas.microsoft.com/office/powerpoint/2012/main"/>
+    </p:ext>
+  </p:extLst>
 </p:presentation>
 </file>
 
@@ -130,12 +135,12 @@
   <pc:docChgLst>
     <pc:chgData name="Abdelrahman Al-Khawas" userId="3f2c01cd7d0cacd7" providerId="LiveId" clId="{EB3B49F8-6F6D-4A54-AE48-A6ED5CF23A6F}"/>
     <pc:docChg chg="custSel modSld">
-      <pc:chgData name="Abdelrahman Al-Khawas" userId="3f2c01cd7d0cacd7" providerId="LiveId" clId="{EB3B49F8-6F6D-4A54-AE48-A6ED5CF23A6F}" dt="2024-10-29T05:34:47.910" v="181" actId="20577"/>
+      <pc:chgData name="Abdelrahman Al-Khawas" userId="3f2c01cd7d0cacd7" providerId="LiveId" clId="{EB3B49F8-6F6D-4A54-AE48-A6ED5CF23A6F}" dt="2024-10-29T23:34:34.871" v="317" actId="20577"/>
       <pc:docMkLst>
         <pc:docMk/>
       </pc:docMkLst>
       <pc:sldChg chg="modSp mod">
-        <pc:chgData name="Abdelrahman Al-Khawas" userId="3f2c01cd7d0cacd7" providerId="LiveId" clId="{EB3B49F8-6F6D-4A54-AE48-A6ED5CF23A6F}" dt="2024-10-29T05:34:25.334" v="168" actId="20577"/>
+        <pc:chgData name="Abdelrahman Al-Khawas" userId="3f2c01cd7d0cacd7" providerId="LiveId" clId="{EB3B49F8-6F6D-4A54-AE48-A6ED5CF23A6F}" dt="2024-10-29T21:10:36.010" v="207" actId="20577"/>
         <pc:sldMkLst>
           <pc:docMk/>
           <pc:sldMk cId="2319911336" sldId="259"/>
@@ -149,7 +154,7 @@
           </ac:spMkLst>
         </pc:spChg>
         <pc:spChg chg="mod">
-          <ac:chgData name="Abdelrahman Al-Khawas" userId="3f2c01cd7d0cacd7" providerId="LiveId" clId="{EB3B49F8-6F6D-4A54-AE48-A6ED5CF23A6F}" dt="2024-10-29T05:33:04.293" v="165" actId="20577"/>
+          <ac:chgData name="Abdelrahman Al-Khawas" userId="3f2c01cd7d0cacd7" providerId="LiveId" clId="{EB3B49F8-6F6D-4A54-AE48-A6ED5CF23A6F}" dt="2024-10-29T21:10:36.010" v="207" actId="20577"/>
           <ac:spMkLst>
             <pc:docMk/>
             <pc:sldMk cId="2319911336" sldId="259"/>
@@ -158,7 +163,7 @@
         </pc:spChg>
       </pc:sldChg>
       <pc:sldChg chg="modSp mod">
-        <pc:chgData name="Abdelrahman Al-Khawas" userId="3f2c01cd7d0cacd7" providerId="LiveId" clId="{EB3B49F8-6F6D-4A54-AE48-A6ED5CF23A6F}" dt="2024-10-29T05:34:47.910" v="181" actId="20577"/>
+        <pc:chgData name="Abdelrahman Al-Khawas" userId="3f2c01cd7d0cacd7" providerId="LiveId" clId="{EB3B49F8-6F6D-4A54-AE48-A6ED5CF23A6F}" dt="2024-10-29T23:34:34.871" v="317" actId="20577"/>
         <pc:sldMkLst>
           <pc:docMk/>
           <pc:sldMk cId="2758596383" sldId="260"/>
@@ -169,6 +174,29 @@
             <pc:docMk/>
             <pc:sldMk cId="2758596383" sldId="260"/>
             <ac:spMk id="2" creationId="{96CF0AC6-C8E8-6F51-254C-B15297159727}"/>
+          </ac:spMkLst>
+        </pc:spChg>
+        <pc:spChg chg="mod">
+          <ac:chgData name="Abdelrahman Al-Khawas" userId="3f2c01cd7d0cacd7" providerId="LiveId" clId="{EB3B49F8-6F6D-4A54-AE48-A6ED5CF23A6F}" dt="2024-10-29T23:34:34.871" v="317" actId="20577"/>
+          <ac:spMkLst>
+            <pc:docMk/>
+            <pc:sldMk cId="2758596383" sldId="260"/>
+            <ac:spMk id="3" creationId="{CDA9B163-5943-0FBA-215B-B3239BD6C342}"/>
+          </ac:spMkLst>
+        </pc:spChg>
+      </pc:sldChg>
+      <pc:sldChg chg="modSp mod">
+        <pc:chgData name="Abdelrahman Al-Khawas" userId="3f2c01cd7d0cacd7" providerId="LiveId" clId="{EB3B49F8-6F6D-4A54-AE48-A6ED5CF23A6F}" dt="2024-10-29T23:24:50.349" v="211" actId="20577"/>
+        <pc:sldMkLst>
+          <pc:docMk/>
+          <pc:sldMk cId="1808146167" sldId="261"/>
+        </pc:sldMkLst>
+        <pc:spChg chg="mod">
+          <ac:chgData name="Abdelrahman Al-Khawas" userId="3f2c01cd7d0cacd7" providerId="LiveId" clId="{EB3B49F8-6F6D-4A54-AE48-A6ED5CF23A6F}" dt="2024-10-29T23:24:50.349" v="211" actId="20577"/>
+          <ac:spMkLst>
+            <pc:docMk/>
+            <pc:sldMk cId="1808146167" sldId="261"/>
+            <ac:spMk id="3" creationId="{E8FFD99E-8637-080F-68B0-6266D1912E89}"/>
           </ac:spMkLst>
         </pc:spChg>
       </pc:sldChg>
@@ -3888,15 +3916,7 @@
             </a:pPr>
             <a:r>
               <a:rPr lang="en-US" dirty="0"/>
-              <a:t>instantiating question: who would be the best option to replace </a:t>
-            </a:r>
-            <a:r>
-              <a:rPr lang="en-US" dirty="0" err="1"/>
-              <a:t>mohamed</a:t>
-            </a:r>
-            <a:r>
-              <a:rPr lang="en-US" dirty="0"/>
-              <a:t> salah next season?</a:t>
+              <a:t>instantiating question: who would be the best option to replace Mohamed Salah next season?</a:t>
             </a:r>
           </a:p>
           <a:p>
@@ -4849,6 +4869,16 @@
               <a:t> / csv of shape 19,564x139</a:t>
             </a:r>
           </a:p>
+          <a:p>
+            <a:pPr>
+              <a:buFontTx/>
+              <a:buChar char="-"/>
+            </a:pPr>
+            <a:r>
+              <a:rPr lang="en-US" dirty="0"/>
+              <a:t>missing metadata</a:t>
+            </a:r>
+          </a:p>
         </p:txBody>
       </p:sp>
     </p:spTree>
@@ -4903,12 +4933,8 @@
           <a:lstStyle/>
           <a:p>
             <a:r>
-              <a:rPr lang="en-US"/>
-              <a:t>next </a:t>
-            </a:r>
-            <a:r>
               <a:rPr lang="en-US" dirty="0"/>
-              <a:t>steps</a:t>
+              <a:t>next steps</a:t>
             </a:r>
           </a:p>
         </p:txBody>
@@ -4934,7 +4960,40 @@
           <a:bodyPr/>
           <a:lstStyle/>
           <a:p>
-            <a:endParaRPr lang="en-US"/>
+            <a:pPr>
+              <a:buFontTx/>
+              <a:buChar char="-"/>
+            </a:pPr>
+            <a:r>
+              <a:rPr lang="en-US" dirty="0"/>
+              <a:t>formalizing similarity (</a:t>
+            </a:r>
+            <a:r>
+              <a:rPr lang="en-US" dirty="0" err="1"/>
+              <a:t>e.g</a:t>
+            </a:r>
+            <a:r>
+              <a:rPr lang="en-US" dirty="0"/>
+              <a:t> Trent vs KDB)</a:t>
+            </a:r>
+          </a:p>
+          <a:p>
+            <a:pPr>
+              <a:buFontTx/>
+              <a:buChar char="-"/>
+            </a:pPr>
+            <a:r>
+              <a:rPr lang="en-US" dirty="0"/>
+              <a:t>p</a:t>
+            </a:r>
+            <a:r>
+              <a:rPr lang="en-US"/>
+              <a:t>redicting </a:t>
+            </a:r>
+            <a:r>
+              <a:rPr lang="en-US" dirty="0"/>
+              <a:t>the future season. </a:t>
+            </a:r>
           </a:p>
         </p:txBody>
       </p:sp>

</xml_diff>

<commit_message>
Sprint 1 almost complete
</commit_message>
<xml_diff>
--- a/presentations/Sprint 1.pptx
+++ b/presentations/Sprint 1.pptx
@@ -5,7 +5,7 @@
     <p:sldMasterId id="2147483648" r:id="rId1"/>
   </p:sldMasterIdLst>
   <p:notesMasterIdLst>
-    <p:notesMasterId r:id="rId10"/>
+    <p:notesMasterId r:id="rId24"/>
   </p:notesMasterIdLst>
   <p:sldIdLst>
     <p:sldId id="256" r:id="rId2"/>
@@ -15,7 +15,21 @@
     <p:sldId id="258" r:id="rId6"/>
     <p:sldId id="263" r:id="rId7"/>
     <p:sldId id="259" r:id="rId8"/>
-    <p:sldId id="260" r:id="rId9"/>
+    <p:sldId id="264" r:id="rId9"/>
+    <p:sldId id="268" r:id="rId10"/>
+    <p:sldId id="265" r:id="rId11"/>
+    <p:sldId id="266" r:id="rId12"/>
+    <p:sldId id="267" r:id="rId13"/>
+    <p:sldId id="269" r:id="rId14"/>
+    <p:sldId id="270" r:id="rId15"/>
+    <p:sldId id="271" r:id="rId16"/>
+    <p:sldId id="272" r:id="rId17"/>
+    <p:sldId id="273" r:id="rId18"/>
+    <p:sldId id="274" r:id="rId19"/>
+    <p:sldId id="275" r:id="rId20"/>
+    <p:sldId id="276" r:id="rId21"/>
+    <p:sldId id="277" r:id="rId22"/>
+    <p:sldId id="260" r:id="rId23"/>
   </p:sldIdLst>
   <p:sldSz cx="12192000" cy="6858000"/>
   <p:notesSz cx="6858000" cy="9144000"/>
@@ -125,7 +139,7 @@
 <file path=ppt/revisionInfo.xml><?xml version="1.0" encoding="utf-8"?>
 <p1510:revInfo xmlns:a="http://schemas.openxmlformats.org/drawingml/2006/main" xmlns:r="http://schemas.openxmlformats.org/officeDocument/2006/relationships" xmlns:p1510="http://schemas.microsoft.com/office/powerpoint/2015/10/main">
   <p1510:revLst>
-    <p1510:client id="{EB3B49F8-6F6D-4A54-AE48-A6ED5CF23A6F}" v="1" dt="2024-10-29T05:25:30.785"/>
+    <p1510:client id="{EB3B49F8-6F6D-4A54-AE48-A6ED5CF23A6F}" v="24" dt="2024-11-01T08:13:43.993"/>
   </p1510:revLst>
 </p1510:revInfo>
 </file>
@@ -134,8 +148,8 @@
 <pc:chgInfo xmlns:a="http://schemas.openxmlformats.org/drawingml/2006/main" xmlns:r="http://schemas.openxmlformats.org/officeDocument/2006/relationships" xmlns:ac="http://schemas.microsoft.com/office/drawing/2013/main/command" xmlns:pc="http://schemas.microsoft.com/office/powerpoint/2013/main/command">
   <pc:docChgLst>
     <pc:chgData name="Abdelrahman Al-Khawas" userId="3f2c01cd7d0cacd7" providerId="LiveId" clId="{EB3B49F8-6F6D-4A54-AE48-A6ED5CF23A6F}"/>
-    <pc:docChg chg="custSel modSld">
-      <pc:chgData name="Abdelrahman Al-Khawas" userId="3f2c01cd7d0cacd7" providerId="LiveId" clId="{EB3B49F8-6F6D-4A54-AE48-A6ED5CF23A6F}" dt="2024-10-29T23:34:34.871" v="317" actId="20577"/>
+    <pc:docChg chg="undo custSel addSld modSld sldOrd">
+      <pc:chgData name="Abdelrahman Al-Khawas" userId="3f2c01cd7d0cacd7" providerId="LiveId" clId="{EB3B49F8-6F6D-4A54-AE48-A6ED5CF23A6F}" dt="2024-11-01T08:13:53.471" v="526" actId="1076"/>
       <pc:docMkLst>
         <pc:docMk/>
       </pc:docMkLst>
@@ -163,7 +177,7 @@
         </pc:spChg>
       </pc:sldChg>
       <pc:sldChg chg="modSp mod">
-        <pc:chgData name="Abdelrahman Al-Khawas" userId="3f2c01cd7d0cacd7" providerId="LiveId" clId="{EB3B49F8-6F6D-4A54-AE48-A6ED5CF23A6F}" dt="2024-10-29T23:34:34.871" v="317" actId="20577"/>
+        <pc:chgData name="Abdelrahman Al-Khawas" userId="3f2c01cd7d0cacd7" providerId="LiveId" clId="{EB3B49F8-6F6D-4A54-AE48-A6ED5CF23A6F}" dt="2024-11-01T07:04:32.182" v="376" actId="20577"/>
         <pc:sldMkLst>
           <pc:docMk/>
           <pc:sldMk cId="2758596383" sldId="260"/>
@@ -177,7 +191,7 @@
           </ac:spMkLst>
         </pc:spChg>
         <pc:spChg chg="mod">
-          <ac:chgData name="Abdelrahman Al-Khawas" userId="3f2c01cd7d0cacd7" providerId="LiveId" clId="{EB3B49F8-6F6D-4A54-AE48-A6ED5CF23A6F}" dt="2024-10-29T23:34:34.871" v="317" actId="20577"/>
+          <ac:chgData name="Abdelrahman Al-Khawas" userId="3f2c01cd7d0cacd7" providerId="LiveId" clId="{EB3B49F8-6F6D-4A54-AE48-A6ED5CF23A6F}" dt="2024-11-01T07:04:32.182" v="376" actId="20577"/>
           <ac:spMkLst>
             <pc:docMk/>
             <pc:sldMk cId="2758596383" sldId="260"/>
@@ -186,19 +200,509 @@
         </pc:spChg>
       </pc:sldChg>
       <pc:sldChg chg="modSp mod">
-        <pc:chgData name="Abdelrahman Al-Khawas" userId="3f2c01cd7d0cacd7" providerId="LiveId" clId="{EB3B49F8-6F6D-4A54-AE48-A6ED5CF23A6F}" dt="2024-10-29T23:24:50.349" v="211" actId="20577"/>
+        <pc:chgData name="Abdelrahman Al-Khawas" userId="3f2c01cd7d0cacd7" providerId="LiveId" clId="{EB3B49F8-6F6D-4A54-AE48-A6ED5CF23A6F}" dt="2024-10-31T20:57:37.949" v="326" actId="20577"/>
         <pc:sldMkLst>
           <pc:docMk/>
           <pc:sldMk cId="1808146167" sldId="261"/>
         </pc:sldMkLst>
         <pc:spChg chg="mod">
-          <ac:chgData name="Abdelrahman Al-Khawas" userId="3f2c01cd7d0cacd7" providerId="LiveId" clId="{EB3B49F8-6F6D-4A54-AE48-A6ED5CF23A6F}" dt="2024-10-29T23:24:50.349" v="211" actId="20577"/>
+          <ac:chgData name="Abdelrahman Al-Khawas" userId="3f2c01cd7d0cacd7" providerId="LiveId" clId="{EB3B49F8-6F6D-4A54-AE48-A6ED5CF23A6F}" dt="2024-10-31T20:57:37.949" v="326" actId="20577"/>
           <ac:spMkLst>
             <pc:docMk/>
             <pc:sldMk cId="1808146167" sldId="261"/>
             <ac:spMk id="3" creationId="{E8FFD99E-8637-080F-68B0-6266D1912E89}"/>
           </ac:spMkLst>
         </pc:spChg>
+      </pc:sldChg>
+      <pc:sldChg chg="addSp delSp modSp new mod">
+        <pc:chgData name="Abdelrahman Al-Khawas" userId="3f2c01cd7d0cacd7" providerId="LiveId" clId="{EB3B49F8-6F6D-4A54-AE48-A6ED5CF23A6F}" dt="2024-11-01T07:34:18.576" v="398" actId="22"/>
+        <pc:sldMkLst>
+          <pc:docMk/>
+          <pc:sldMk cId="1405563612" sldId="264"/>
+        </pc:sldMkLst>
+        <pc:spChg chg="del">
+          <ac:chgData name="Abdelrahman Al-Khawas" userId="3f2c01cd7d0cacd7" providerId="LiveId" clId="{EB3B49F8-6F6D-4A54-AE48-A6ED5CF23A6F}" dt="2024-11-01T07:05:19.989" v="377"/>
+          <ac:spMkLst>
+            <pc:docMk/>
+            <pc:sldMk cId="1405563612" sldId="264"/>
+            <ac:spMk id="3" creationId="{A1BC3F9D-EA51-CCFE-F560-033364A357D4}"/>
+          </ac:spMkLst>
+        </pc:spChg>
+        <pc:spChg chg="add del mod">
+          <ac:chgData name="Abdelrahman Al-Khawas" userId="3f2c01cd7d0cacd7" providerId="LiveId" clId="{EB3B49F8-6F6D-4A54-AE48-A6ED5CF23A6F}" dt="2024-11-01T07:07:32.453" v="382"/>
+          <ac:spMkLst>
+            <pc:docMk/>
+            <pc:sldMk cId="1405563612" sldId="264"/>
+            <ac:spMk id="6" creationId="{69BF6D43-72D7-C82C-162F-D3D286C09FF0}"/>
+          </ac:spMkLst>
+        </pc:spChg>
+        <pc:spChg chg="add del mod">
+          <ac:chgData name="Abdelrahman Al-Khawas" userId="3f2c01cd7d0cacd7" providerId="LiveId" clId="{EB3B49F8-6F6D-4A54-AE48-A6ED5CF23A6F}" dt="2024-11-01T07:13:41.220" v="386"/>
+          <ac:spMkLst>
+            <pc:docMk/>
+            <pc:sldMk cId="1405563612" sldId="264"/>
+            <ac:spMk id="9" creationId="{0236E23A-9B11-0C56-A236-5A5D5CAD7EBA}"/>
+          </ac:spMkLst>
+        </pc:spChg>
+        <pc:spChg chg="add del mod">
+          <ac:chgData name="Abdelrahman Al-Khawas" userId="3f2c01cd7d0cacd7" providerId="LiveId" clId="{EB3B49F8-6F6D-4A54-AE48-A6ED5CF23A6F}" dt="2024-11-01T07:33:21.439" v="394" actId="22"/>
+          <ac:spMkLst>
+            <pc:docMk/>
+            <pc:sldMk cId="1405563612" sldId="264"/>
+            <ac:spMk id="14" creationId="{4D7D1E16-C3D7-26DB-5F4E-995CDD8AE2BC}"/>
+          </ac:spMkLst>
+        </pc:spChg>
+        <pc:graphicFrameChg chg="add del mod">
+          <ac:chgData name="Abdelrahman Al-Khawas" userId="3f2c01cd7d0cacd7" providerId="LiveId" clId="{EB3B49F8-6F6D-4A54-AE48-A6ED5CF23A6F}" dt="2024-11-01T07:06:18.923" v="381" actId="478"/>
+          <ac:graphicFrameMkLst>
+            <pc:docMk/>
+            <pc:sldMk cId="1405563612" sldId="264"/>
+            <ac:graphicFrameMk id="4" creationId="{7D30095F-B0CA-BDC3-65AE-35CC46EAB7E9}"/>
+          </ac:graphicFrameMkLst>
+        </pc:graphicFrameChg>
+        <pc:graphicFrameChg chg="add del mod">
+          <ac:chgData name="Abdelrahman Al-Khawas" userId="3f2c01cd7d0cacd7" providerId="LiveId" clId="{EB3B49F8-6F6D-4A54-AE48-A6ED5CF23A6F}" dt="2024-11-01T07:07:53.317" v="385" actId="478"/>
+          <ac:graphicFrameMkLst>
+            <pc:docMk/>
+            <pc:sldMk cId="1405563612" sldId="264"/>
+            <ac:graphicFrameMk id="7" creationId="{9C4AB763-D474-8B90-E319-05D2E348E144}"/>
+          </ac:graphicFrameMkLst>
+        </pc:graphicFrameChg>
+        <pc:graphicFrameChg chg="add del mod">
+          <ac:chgData name="Abdelrahman Al-Khawas" userId="3f2c01cd7d0cacd7" providerId="LiveId" clId="{EB3B49F8-6F6D-4A54-AE48-A6ED5CF23A6F}" dt="2024-11-01T07:13:54.226" v="393" actId="478"/>
+          <ac:graphicFrameMkLst>
+            <pc:docMk/>
+            <pc:sldMk cId="1405563612" sldId="264"/>
+            <ac:graphicFrameMk id="12" creationId="{85121032-B1FC-2510-E48B-464F8AC875AC}"/>
+          </ac:graphicFrameMkLst>
+        </pc:graphicFrameChg>
+        <pc:picChg chg="add mod ord">
+          <ac:chgData name="Abdelrahman Al-Khawas" userId="3f2c01cd7d0cacd7" providerId="LiveId" clId="{EB3B49F8-6F6D-4A54-AE48-A6ED5CF23A6F}" dt="2024-11-01T07:33:36.651" v="397" actId="1076"/>
+          <ac:picMkLst>
+            <pc:docMk/>
+            <pc:sldMk cId="1405563612" sldId="264"/>
+            <ac:picMk id="16" creationId="{01570677-8C1A-F915-580C-F841CF997E5E}"/>
+          </ac:picMkLst>
+        </pc:picChg>
+        <pc:picChg chg="add">
+          <ac:chgData name="Abdelrahman Al-Khawas" userId="3f2c01cd7d0cacd7" providerId="LiveId" clId="{EB3B49F8-6F6D-4A54-AE48-A6ED5CF23A6F}" dt="2024-11-01T07:34:18.576" v="398" actId="22"/>
+          <ac:picMkLst>
+            <pc:docMk/>
+            <pc:sldMk cId="1405563612" sldId="264"/>
+            <ac:picMk id="18" creationId="{C42EFE5D-398B-4A04-829B-F9C901C0D22D}"/>
+          </ac:picMkLst>
+        </pc:picChg>
+      </pc:sldChg>
+      <pc:sldChg chg="addSp delSp modSp new mod">
+        <pc:chgData name="Abdelrahman Al-Khawas" userId="3f2c01cd7d0cacd7" providerId="LiveId" clId="{EB3B49F8-6F6D-4A54-AE48-A6ED5CF23A6F}" dt="2024-11-01T07:48:36.427" v="414" actId="1076"/>
+        <pc:sldMkLst>
+          <pc:docMk/>
+          <pc:sldMk cId="63888143" sldId="265"/>
+        </pc:sldMkLst>
+        <pc:spChg chg="del">
+          <ac:chgData name="Abdelrahman Al-Khawas" userId="3f2c01cd7d0cacd7" providerId="LiveId" clId="{EB3B49F8-6F6D-4A54-AE48-A6ED5CF23A6F}" dt="2024-11-01T07:48:18.792" v="406" actId="931"/>
+          <ac:spMkLst>
+            <pc:docMk/>
+            <pc:sldMk cId="63888143" sldId="265"/>
+            <ac:spMk id="3" creationId="{2E3A225D-E7A4-D00B-4E80-C19E74549A37}"/>
+          </ac:spMkLst>
+        </pc:spChg>
+        <pc:picChg chg="add del mod">
+          <ac:chgData name="Abdelrahman Al-Khawas" userId="3f2c01cd7d0cacd7" providerId="LiveId" clId="{EB3B49F8-6F6D-4A54-AE48-A6ED5CF23A6F}" dt="2024-11-01T07:46:24.760" v="404" actId="478"/>
+          <ac:picMkLst>
+            <pc:docMk/>
+            <pc:sldMk cId="63888143" sldId="265"/>
+            <ac:picMk id="5" creationId="{A1149DB7-4954-8185-E27A-588889ECF97C}"/>
+          </ac:picMkLst>
+        </pc:picChg>
+        <pc:picChg chg="add del">
+          <ac:chgData name="Abdelrahman Al-Khawas" userId="3f2c01cd7d0cacd7" providerId="LiveId" clId="{EB3B49F8-6F6D-4A54-AE48-A6ED5CF23A6F}" dt="2024-11-01T07:48:25.958" v="411" actId="478"/>
+          <ac:picMkLst>
+            <pc:docMk/>
+            <pc:sldMk cId="63888143" sldId="265"/>
+            <ac:picMk id="7" creationId="{0E294BD1-77C6-06B3-45A1-B8B93C6557B5}"/>
+          </ac:picMkLst>
+        </pc:picChg>
+        <pc:picChg chg="add mod">
+          <ac:chgData name="Abdelrahman Al-Khawas" userId="3f2c01cd7d0cacd7" providerId="LiveId" clId="{EB3B49F8-6F6D-4A54-AE48-A6ED5CF23A6F}" dt="2024-11-01T07:48:36.427" v="414" actId="1076"/>
+          <ac:picMkLst>
+            <pc:docMk/>
+            <pc:sldMk cId="63888143" sldId="265"/>
+            <ac:picMk id="9" creationId="{29BC4C35-5C34-10A6-F2EA-ED58BC867609}"/>
+          </ac:picMkLst>
+        </pc:picChg>
+      </pc:sldChg>
+      <pc:sldChg chg="addSp delSp modSp new mod">
+        <pc:chgData name="Abdelrahman Al-Khawas" userId="3f2c01cd7d0cacd7" providerId="LiveId" clId="{EB3B49F8-6F6D-4A54-AE48-A6ED5CF23A6F}" dt="2024-11-01T07:49:47.489" v="421" actId="1076"/>
+        <pc:sldMkLst>
+          <pc:docMk/>
+          <pc:sldMk cId="3274303137" sldId="266"/>
+        </pc:sldMkLst>
+        <pc:spChg chg="del">
+          <ac:chgData name="Abdelrahman Al-Khawas" userId="3f2c01cd7d0cacd7" providerId="LiveId" clId="{EB3B49F8-6F6D-4A54-AE48-A6ED5CF23A6F}" dt="2024-11-01T07:49:33.097" v="415"/>
+          <ac:spMkLst>
+            <pc:docMk/>
+            <pc:sldMk cId="3274303137" sldId="266"/>
+            <ac:spMk id="3" creationId="{5C012FBB-071B-FC62-7AA5-A81BD202D5E0}"/>
+          </ac:spMkLst>
+        </pc:spChg>
+        <pc:picChg chg="add mod">
+          <ac:chgData name="Abdelrahman Al-Khawas" userId="3f2c01cd7d0cacd7" providerId="LiveId" clId="{EB3B49F8-6F6D-4A54-AE48-A6ED5CF23A6F}" dt="2024-11-01T07:49:47.489" v="421" actId="1076"/>
+          <ac:picMkLst>
+            <pc:docMk/>
+            <pc:sldMk cId="3274303137" sldId="266"/>
+            <ac:picMk id="5" creationId="{47278FC5-8997-14D0-85F8-91B9A8588A92}"/>
+          </ac:picMkLst>
+        </pc:picChg>
+      </pc:sldChg>
+      <pc:sldChg chg="addSp delSp modSp new mod">
+        <pc:chgData name="Abdelrahman Al-Khawas" userId="3f2c01cd7d0cacd7" providerId="LiveId" clId="{EB3B49F8-6F6D-4A54-AE48-A6ED5CF23A6F}" dt="2024-11-01T07:51:22.669" v="431" actId="1076"/>
+        <pc:sldMkLst>
+          <pc:docMk/>
+          <pc:sldMk cId="2643263005" sldId="267"/>
+        </pc:sldMkLst>
+        <pc:spChg chg="del">
+          <ac:chgData name="Abdelrahman Al-Khawas" userId="3f2c01cd7d0cacd7" providerId="LiveId" clId="{EB3B49F8-6F6D-4A54-AE48-A6ED5CF23A6F}" dt="2024-11-01T07:51:07.147" v="425" actId="931"/>
+          <ac:spMkLst>
+            <pc:docMk/>
+            <pc:sldMk cId="2643263005" sldId="267"/>
+            <ac:spMk id="3" creationId="{90F10A92-69A0-1BE5-DFE4-9AFA037C65C2}"/>
+          </ac:spMkLst>
+        </pc:spChg>
+        <pc:spChg chg="add del">
+          <ac:chgData name="Abdelrahman Al-Khawas" userId="3f2c01cd7d0cacd7" providerId="LiveId" clId="{EB3B49F8-6F6D-4A54-AE48-A6ED5CF23A6F}" dt="2024-11-01T07:51:00.277" v="424" actId="22"/>
+          <ac:spMkLst>
+            <pc:docMk/>
+            <pc:sldMk cId="2643263005" sldId="267"/>
+            <ac:spMk id="5" creationId="{42DF9C82-347F-C168-7D24-E08E6964A4BC}"/>
+          </ac:spMkLst>
+        </pc:spChg>
+        <pc:picChg chg="add mod">
+          <ac:chgData name="Abdelrahman Al-Khawas" userId="3f2c01cd7d0cacd7" providerId="LiveId" clId="{EB3B49F8-6F6D-4A54-AE48-A6ED5CF23A6F}" dt="2024-11-01T07:51:22.669" v="431" actId="1076"/>
+          <ac:picMkLst>
+            <pc:docMk/>
+            <pc:sldMk cId="2643263005" sldId="267"/>
+            <ac:picMk id="7" creationId="{3C90785C-1287-1481-9DEE-244004107234}"/>
+          </ac:picMkLst>
+        </pc:picChg>
+      </pc:sldChg>
+      <pc:sldChg chg="addSp delSp modSp new mod ord modMedia setBg modClrScheme addAnim delAnim chgLayout">
+        <pc:chgData name="Abdelrahman Al-Khawas" userId="3f2c01cd7d0cacd7" providerId="LiveId" clId="{EB3B49F8-6F6D-4A54-AE48-A6ED5CF23A6F}" dt="2024-11-01T07:53:04.617" v="451" actId="26606"/>
+        <pc:sldMkLst>
+          <pc:docMk/>
+          <pc:sldMk cId="1941129471" sldId="268"/>
+        </pc:sldMkLst>
+        <pc:spChg chg="del mod ord">
+          <ac:chgData name="Abdelrahman Al-Khawas" userId="3f2c01cd7d0cacd7" providerId="LiveId" clId="{EB3B49F8-6F6D-4A54-AE48-A6ED5CF23A6F}" dt="2024-11-01T07:52:10.069" v="435" actId="700"/>
+          <ac:spMkLst>
+            <pc:docMk/>
+            <pc:sldMk cId="1941129471" sldId="268"/>
+            <ac:spMk id="2" creationId="{795D2722-ACD6-0F0B-989B-C299693F9629}"/>
+          </ac:spMkLst>
+        </pc:spChg>
+        <pc:spChg chg="del mod ord">
+          <ac:chgData name="Abdelrahman Al-Khawas" userId="3f2c01cd7d0cacd7" providerId="LiveId" clId="{EB3B49F8-6F6D-4A54-AE48-A6ED5CF23A6F}" dt="2024-11-01T07:52:10.069" v="435" actId="700"/>
+          <ac:spMkLst>
+            <pc:docMk/>
+            <pc:sldMk cId="1941129471" sldId="268"/>
+            <ac:spMk id="3" creationId="{50C8704B-34CB-FE76-54E5-DA165C2056CC}"/>
+          </ac:spMkLst>
+        </pc:spChg>
+        <pc:spChg chg="add mod ord">
+          <ac:chgData name="Abdelrahman Al-Khawas" userId="3f2c01cd7d0cacd7" providerId="LiveId" clId="{EB3B49F8-6F6D-4A54-AE48-A6ED5CF23A6F}" dt="2024-11-01T07:53:04.617" v="451" actId="26606"/>
+          <ac:spMkLst>
+            <pc:docMk/>
+            <pc:sldMk cId="1941129471" sldId="268"/>
+            <ac:spMk id="4" creationId="{01207D05-F033-CE19-61F3-133FD65A8F15}"/>
+          </ac:spMkLst>
+        </pc:spChg>
+        <pc:spChg chg="add mod ord">
+          <ac:chgData name="Abdelrahman Al-Khawas" userId="3f2c01cd7d0cacd7" providerId="LiveId" clId="{EB3B49F8-6F6D-4A54-AE48-A6ED5CF23A6F}" dt="2024-11-01T07:53:04.617" v="451" actId="26606"/>
+          <ac:spMkLst>
+            <pc:docMk/>
+            <pc:sldMk cId="1941129471" sldId="268"/>
+            <ac:spMk id="5" creationId="{F186CEC1-07B2-3085-56AC-42A3ADB0621A}"/>
+          </ac:spMkLst>
+        </pc:spChg>
+        <pc:spChg chg="add del">
+          <ac:chgData name="Abdelrahman Al-Khawas" userId="3f2c01cd7d0cacd7" providerId="LiveId" clId="{EB3B49F8-6F6D-4A54-AE48-A6ED5CF23A6F}" dt="2024-11-01T07:53:04.617" v="451" actId="26606"/>
+          <ac:spMkLst>
+            <pc:docMk/>
+            <pc:sldMk cId="1941129471" sldId="268"/>
+            <ac:spMk id="11" creationId="{C1DD1A8A-57D5-4A81-AD04-532B043C5611}"/>
+          </ac:spMkLst>
+        </pc:spChg>
+        <pc:spChg chg="add del">
+          <ac:chgData name="Abdelrahman Al-Khawas" userId="3f2c01cd7d0cacd7" providerId="LiveId" clId="{EB3B49F8-6F6D-4A54-AE48-A6ED5CF23A6F}" dt="2024-11-01T07:53:04.617" v="451" actId="26606"/>
+          <ac:spMkLst>
+            <pc:docMk/>
+            <pc:sldMk cId="1941129471" sldId="268"/>
+            <ac:spMk id="13" creationId="{007891EC-4501-44ED-A8C8-B11B6DB767AB}"/>
+          </ac:spMkLst>
+        </pc:spChg>
+        <pc:picChg chg="add del mod">
+          <ac:chgData name="Abdelrahman Al-Khawas" userId="3f2c01cd7d0cacd7" providerId="LiveId" clId="{EB3B49F8-6F6D-4A54-AE48-A6ED5CF23A6F}" dt="2024-11-01T07:53:04.617" v="451" actId="26606"/>
+          <ac:picMkLst>
+            <pc:docMk/>
+            <pc:sldMk cId="1941129471" sldId="268"/>
+            <ac:picMk id="7" creationId="{9275D2A3-22CB-2D99-3FFC-DFF0BD0FEB99}"/>
+          </ac:picMkLst>
+        </pc:picChg>
+      </pc:sldChg>
+      <pc:sldChg chg="addSp delSp modSp new mod modClrScheme chgLayout">
+        <pc:chgData name="Abdelrahman Al-Khawas" userId="3f2c01cd7d0cacd7" providerId="LiveId" clId="{EB3B49F8-6F6D-4A54-AE48-A6ED5CF23A6F}" dt="2024-11-01T07:53:22.970" v="464" actId="20577"/>
+        <pc:sldMkLst>
+          <pc:docMk/>
+          <pc:sldMk cId="1590635831" sldId="269"/>
+        </pc:sldMkLst>
+        <pc:spChg chg="del mod ord">
+          <ac:chgData name="Abdelrahman Al-Khawas" userId="3f2c01cd7d0cacd7" providerId="LiveId" clId="{EB3B49F8-6F6D-4A54-AE48-A6ED5CF23A6F}" dt="2024-11-01T07:53:14.919" v="453" actId="700"/>
+          <ac:spMkLst>
+            <pc:docMk/>
+            <pc:sldMk cId="1590635831" sldId="269"/>
+            <ac:spMk id="2" creationId="{34E262D2-A9F6-FDD1-C136-461AFE6970F8}"/>
+          </ac:spMkLst>
+        </pc:spChg>
+        <pc:spChg chg="del mod ord">
+          <ac:chgData name="Abdelrahman Al-Khawas" userId="3f2c01cd7d0cacd7" providerId="LiveId" clId="{EB3B49F8-6F6D-4A54-AE48-A6ED5CF23A6F}" dt="2024-11-01T07:53:14.919" v="453" actId="700"/>
+          <ac:spMkLst>
+            <pc:docMk/>
+            <pc:sldMk cId="1590635831" sldId="269"/>
+            <ac:spMk id="3" creationId="{C22BE079-EC97-2031-E90E-055264981C73}"/>
+          </ac:spMkLst>
+        </pc:spChg>
+        <pc:spChg chg="add mod ord">
+          <ac:chgData name="Abdelrahman Al-Khawas" userId="3f2c01cd7d0cacd7" providerId="LiveId" clId="{EB3B49F8-6F6D-4A54-AE48-A6ED5CF23A6F}" dt="2024-11-01T07:53:22.970" v="464" actId="20577"/>
+          <ac:spMkLst>
+            <pc:docMk/>
+            <pc:sldMk cId="1590635831" sldId="269"/>
+            <ac:spMk id="4" creationId="{BA41BCA8-6AFF-C960-1E82-15CC6656DD44}"/>
+          </ac:spMkLst>
+        </pc:spChg>
+        <pc:spChg chg="add mod ord">
+          <ac:chgData name="Abdelrahman Al-Khawas" userId="3f2c01cd7d0cacd7" providerId="LiveId" clId="{EB3B49F8-6F6D-4A54-AE48-A6ED5CF23A6F}" dt="2024-11-01T07:53:14.919" v="453" actId="700"/>
+          <ac:spMkLst>
+            <pc:docMk/>
+            <pc:sldMk cId="1590635831" sldId="269"/>
+            <ac:spMk id="5" creationId="{14D1FBA7-6B77-9CE3-67A8-1BDACB3E55B5}"/>
+          </ac:spMkLst>
+        </pc:spChg>
+      </pc:sldChg>
+      <pc:sldChg chg="addSp delSp modSp new mod">
+        <pc:chgData name="Abdelrahman Al-Khawas" userId="3f2c01cd7d0cacd7" providerId="LiveId" clId="{EB3B49F8-6F6D-4A54-AE48-A6ED5CF23A6F}" dt="2024-11-01T07:54:24.257" v="471" actId="1076"/>
+        <pc:sldMkLst>
+          <pc:docMk/>
+          <pc:sldMk cId="499973568" sldId="270"/>
+        </pc:sldMkLst>
+        <pc:spChg chg="del">
+          <ac:chgData name="Abdelrahman Al-Khawas" userId="3f2c01cd7d0cacd7" providerId="LiveId" clId="{EB3B49F8-6F6D-4A54-AE48-A6ED5CF23A6F}" dt="2024-11-01T07:54:14.847" v="466"/>
+          <ac:spMkLst>
+            <pc:docMk/>
+            <pc:sldMk cId="499973568" sldId="270"/>
+            <ac:spMk id="3" creationId="{EDF32E1A-1283-A290-C6A6-C24B3656834F}"/>
+          </ac:spMkLst>
+        </pc:spChg>
+        <pc:picChg chg="add mod">
+          <ac:chgData name="Abdelrahman Al-Khawas" userId="3f2c01cd7d0cacd7" providerId="LiveId" clId="{EB3B49F8-6F6D-4A54-AE48-A6ED5CF23A6F}" dt="2024-11-01T07:54:24.257" v="471" actId="1076"/>
+          <ac:picMkLst>
+            <pc:docMk/>
+            <pc:sldMk cId="499973568" sldId="270"/>
+            <ac:picMk id="5" creationId="{188DCE11-6712-DC1F-C5C7-1A7D6D83B7FB}"/>
+          </ac:picMkLst>
+        </pc:picChg>
+      </pc:sldChg>
+      <pc:sldChg chg="addSp delSp modSp new mod">
+        <pc:chgData name="Abdelrahman Al-Khawas" userId="3f2c01cd7d0cacd7" providerId="LiveId" clId="{EB3B49F8-6F6D-4A54-AE48-A6ED5CF23A6F}" dt="2024-11-01T07:56:03.373" v="478" actId="1076"/>
+        <pc:sldMkLst>
+          <pc:docMk/>
+          <pc:sldMk cId="3835704787" sldId="271"/>
+        </pc:sldMkLst>
+        <pc:spChg chg="del">
+          <ac:chgData name="Abdelrahman Al-Khawas" userId="3f2c01cd7d0cacd7" providerId="LiveId" clId="{EB3B49F8-6F6D-4A54-AE48-A6ED5CF23A6F}" dt="2024-11-01T07:55:52.852" v="473"/>
+          <ac:spMkLst>
+            <pc:docMk/>
+            <pc:sldMk cId="3835704787" sldId="271"/>
+            <ac:spMk id="3" creationId="{D060D3B4-D69C-223F-9499-2D136F9D9D8C}"/>
+          </ac:spMkLst>
+        </pc:spChg>
+        <pc:picChg chg="add mod">
+          <ac:chgData name="Abdelrahman Al-Khawas" userId="3f2c01cd7d0cacd7" providerId="LiveId" clId="{EB3B49F8-6F6D-4A54-AE48-A6ED5CF23A6F}" dt="2024-11-01T07:56:03.373" v="478" actId="1076"/>
+          <ac:picMkLst>
+            <pc:docMk/>
+            <pc:sldMk cId="3835704787" sldId="271"/>
+            <ac:picMk id="5" creationId="{EECCB797-1EB9-1501-CD3A-787F6051890B}"/>
+          </ac:picMkLst>
+        </pc:picChg>
+      </pc:sldChg>
+      <pc:sldChg chg="addSp delSp modSp new mod modClrScheme chgLayout">
+        <pc:chgData name="Abdelrahman Al-Khawas" userId="3f2c01cd7d0cacd7" providerId="LiveId" clId="{EB3B49F8-6F6D-4A54-AE48-A6ED5CF23A6F}" dt="2024-11-01T08:01:34.828" v="487" actId="20577"/>
+        <pc:sldMkLst>
+          <pc:docMk/>
+          <pc:sldMk cId="3631412117" sldId="272"/>
+        </pc:sldMkLst>
+        <pc:spChg chg="del mod ord">
+          <ac:chgData name="Abdelrahman Al-Khawas" userId="3f2c01cd7d0cacd7" providerId="LiveId" clId="{EB3B49F8-6F6D-4A54-AE48-A6ED5CF23A6F}" dt="2024-11-01T08:01:30.274" v="480" actId="700"/>
+          <ac:spMkLst>
+            <pc:docMk/>
+            <pc:sldMk cId="3631412117" sldId="272"/>
+            <ac:spMk id="2" creationId="{5BC8CBB8-1E41-7915-92F7-39BB747B98E9}"/>
+          </ac:spMkLst>
+        </pc:spChg>
+        <pc:spChg chg="del mod ord">
+          <ac:chgData name="Abdelrahman Al-Khawas" userId="3f2c01cd7d0cacd7" providerId="LiveId" clId="{EB3B49F8-6F6D-4A54-AE48-A6ED5CF23A6F}" dt="2024-11-01T08:01:30.274" v="480" actId="700"/>
+          <ac:spMkLst>
+            <pc:docMk/>
+            <pc:sldMk cId="3631412117" sldId="272"/>
+            <ac:spMk id="3" creationId="{3C578C3B-83F8-4E44-645A-BA3C4EBA9CAF}"/>
+          </ac:spMkLst>
+        </pc:spChg>
+        <pc:spChg chg="add mod ord">
+          <ac:chgData name="Abdelrahman Al-Khawas" userId="3f2c01cd7d0cacd7" providerId="LiveId" clId="{EB3B49F8-6F6D-4A54-AE48-A6ED5CF23A6F}" dt="2024-11-01T08:01:34.828" v="487" actId="20577"/>
+          <ac:spMkLst>
+            <pc:docMk/>
+            <pc:sldMk cId="3631412117" sldId="272"/>
+            <ac:spMk id="4" creationId="{F81C79BC-C1B6-1FA8-B564-6BFFC82FCC3A}"/>
+          </ac:spMkLst>
+        </pc:spChg>
+        <pc:spChg chg="add mod ord">
+          <ac:chgData name="Abdelrahman Al-Khawas" userId="3f2c01cd7d0cacd7" providerId="LiveId" clId="{EB3B49F8-6F6D-4A54-AE48-A6ED5CF23A6F}" dt="2024-11-01T08:01:30.274" v="480" actId="700"/>
+          <ac:spMkLst>
+            <pc:docMk/>
+            <pc:sldMk cId="3631412117" sldId="272"/>
+            <ac:spMk id="5" creationId="{26A0638C-A51F-497D-37D6-66B9C1CC7441}"/>
+          </ac:spMkLst>
+        </pc:spChg>
+      </pc:sldChg>
+      <pc:sldChg chg="addSp delSp modSp new mod">
+        <pc:chgData name="Abdelrahman Al-Khawas" userId="3f2c01cd7d0cacd7" providerId="LiveId" clId="{EB3B49F8-6F6D-4A54-AE48-A6ED5CF23A6F}" dt="2024-11-01T08:03:19.821" v="498" actId="1076"/>
+        <pc:sldMkLst>
+          <pc:docMk/>
+          <pc:sldMk cId="3602922579" sldId="273"/>
+        </pc:sldMkLst>
+        <pc:spChg chg="del">
+          <ac:chgData name="Abdelrahman Al-Khawas" userId="3f2c01cd7d0cacd7" providerId="LiveId" clId="{EB3B49F8-6F6D-4A54-AE48-A6ED5CF23A6F}" dt="2024-11-01T08:03:08.824" v="493"/>
+          <ac:spMkLst>
+            <pc:docMk/>
+            <pc:sldMk cId="3602922579" sldId="273"/>
+            <ac:spMk id="3" creationId="{B8D502F6-5089-5D2F-063B-0F7A879ED8E0}"/>
+          </ac:spMkLst>
+        </pc:spChg>
+        <pc:picChg chg="add mod">
+          <ac:chgData name="Abdelrahman Al-Khawas" userId="3f2c01cd7d0cacd7" providerId="LiveId" clId="{EB3B49F8-6F6D-4A54-AE48-A6ED5CF23A6F}" dt="2024-11-01T08:03:19.821" v="498" actId="1076"/>
+          <ac:picMkLst>
+            <pc:docMk/>
+            <pc:sldMk cId="3602922579" sldId="273"/>
+            <ac:picMk id="5" creationId="{8970DC13-56AC-4AAD-F722-D21DA766C4AC}"/>
+          </ac:picMkLst>
+        </pc:picChg>
+      </pc:sldChg>
+      <pc:sldChg chg="addSp delSp modSp add mod">
+        <pc:chgData name="Abdelrahman Al-Khawas" userId="3f2c01cd7d0cacd7" providerId="LiveId" clId="{EB3B49F8-6F6D-4A54-AE48-A6ED5CF23A6F}" dt="2024-11-01T08:04:47.889" v="504" actId="1076"/>
+        <pc:sldMkLst>
+          <pc:docMk/>
+          <pc:sldMk cId="1190860437" sldId="274"/>
+        </pc:sldMkLst>
+        <pc:spChg chg="del">
+          <ac:chgData name="Abdelrahman Al-Khawas" userId="3f2c01cd7d0cacd7" providerId="LiveId" clId="{EB3B49F8-6F6D-4A54-AE48-A6ED5CF23A6F}" dt="2024-11-01T08:04:36.917" v="499"/>
+          <ac:spMkLst>
+            <pc:docMk/>
+            <pc:sldMk cId="1190860437" sldId="274"/>
+            <ac:spMk id="3" creationId="{CD7DEB4D-40F9-C604-D628-BEFECFDF28D7}"/>
+          </ac:spMkLst>
+        </pc:spChg>
+        <pc:picChg chg="add mod">
+          <ac:chgData name="Abdelrahman Al-Khawas" userId="3f2c01cd7d0cacd7" providerId="LiveId" clId="{EB3B49F8-6F6D-4A54-AE48-A6ED5CF23A6F}" dt="2024-11-01T08:04:47.889" v="504" actId="1076"/>
+          <ac:picMkLst>
+            <pc:docMk/>
+            <pc:sldMk cId="1190860437" sldId="274"/>
+            <ac:picMk id="5" creationId="{0539D350-52C0-0030-A2EF-71BBBAA5AC69}"/>
+          </ac:picMkLst>
+        </pc:picChg>
+      </pc:sldChg>
+      <pc:sldChg chg="addSp delSp modSp add mod modClrScheme chgLayout">
+        <pc:chgData name="Abdelrahman Al-Khawas" userId="3f2c01cd7d0cacd7" providerId="LiveId" clId="{EB3B49F8-6F6D-4A54-AE48-A6ED5CF23A6F}" dt="2024-11-01T08:10:58.062" v="514" actId="20577"/>
+        <pc:sldMkLst>
+          <pc:docMk/>
+          <pc:sldMk cId="3292053593" sldId="275"/>
+        </pc:sldMkLst>
+        <pc:spChg chg="del mod ord">
+          <ac:chgData name="Abdelrahman Al-Khawas" userId="3f2c01cd7d0cacd7" providerId="LiveId" clId="{EB3B49F8-6F6D-4A54-AE48-A6ED5CF23A6F}" dt="2024-11-01T08:10:53.910" v="505" actId="700"/>
+          <ac:spMkLst>
+            <pc:docMk/>
+            <pc:sldMk cId="3292053593" sldId="275"/>
+            <ac:spMk id="2" creationId="{270E364B-E844-179D-7D0F-9CA10F09EB6F}"/>
+          </ac:spMkLst>
+        </pc:spChg>
+        <pc:spChg chg="del mod ord">
+          <ac:chgData name="Abdelrahman Al-Khawas" userId="3f2c01cd7d0cacd7" providerId="LiveId" clId="{EB3B49F8-6F6D-4A54-AE48-A6ED5CF23A6F}" dt="2024-11-01T08:10:53.910" v="505" actId="700"/>
+          <ac:spMkLst>
+            <pc:docMk/>
+            <pc:sldMk cId="3292053593" sldId="275"/>
+            <ac:spMk id="3" creationId="{2170C186-1921-5E55-6A6C-84581A5EE274}"/>
+          </ac:spMkLst>
+        </pc:spChg>
+        <pc:spChg chg="add mod ord">
+          <ac:chgData name="Abdelrahman Al-Khawas" userId="3f2c01cd7d0cacd7" providerId="LiveId" clId="{EB3B49F8-6F6D-4A54-AE48-A6ED5CF23A6F}" dt="2024-11-01T08:10:58.062" v="514" actId="20577"/>
+          <ac:spMkLst>
+            <pc:docMk/>
+            <pc:sldMk cId="3292053593" sldId="275"/>
+            <ac:spMk id="4" creationId="{0E32D01E-3E55-D83D-0DEE-79A5585E0CD6}"/>
+          </ac:spMkLst>
+        </pc:spChg>
+        <pc:spChg chg="add mod ord">
+          <ac:chgData name="Abdelrahman Al-Khawas" userId="3f2c01cd7d0cacd7" providerId="LiveId" clId="{EB3B49F8-6F6D-4A54-AE48-A6ED5CF23A6F}" dt="2024-11-01T08:10:53.910" v="505" actId="700"/>
+          <ac:spMkLst>
+            <pc:docMk/>
+            <pc:sldMk cId="3292053593" sldId="275"/>
+            <ac:spMk id="5" creationId="{F58F0C82-50FD-C80D-E36A-8F957DDF9108}"/>
+          </ac:spMkLst>
+        </pc:spChg>
+      </pc:sldChg>
+      <pc:sldChg chg="addSp delSp modSp add mod">
+        <pc:chgData name="Abdelrahman Al-Khawas" userId="3f2c01cd7d0cacd7" providerId="LiveId" clId="{EB3B49F8-6F6D-4A54-AE48-A6ED5CF23A6F}" dt="2024-11-01T08:11:22.136" v="520" actId="1076"/>
+        <pc:sldMkLst>
+          <pc:docMk/>
+          <pc:sldMk cId="1958594030" sldId="276"/>
+        </pc:sldMkLst>
+        <pc:spChg chg="del">
+          <ac:chgData name="Abdelrahman Al-Khawas" userId="3f2c01cd7d0cacd7" providerId="LiveId" clId="{EB3B49F8-6F6D-4A54-AE48-A6ED5CF23A6F}" dt="2024-11-01T08:11:13.159" v="515"/>
+          <ac:spMkLst>
+            <pc:docMk/>
+            <pc:sldMk cId="1958594030" sldId="276"/>
+            <ac:spMk id="3" creationId="{55EEAA99-67DF-6755-5D76-F8F5C43334EB}"/>
+          </ac:spMkLst>
+        </pc:spChg>
+        <pc:picChg chg="add mod">
+          <ac:chgData name="Abdelrahman Al-Khawas" userId="3f2c01cd7d0cacd7" providerId="LiveId" clId="{EB3B49F8-6F6D-4A54-AE48-A6ED5CF23A6F}" dt="2024-11-01T08:11:22.136" v="520" actId="1076"/>
+          <ac:picMkLst>
+            <pc:docMk/>
+            <pc:sldMk cId="1958594030" sldId="276"/>
+            <ac:picMk id="5" creationId="{2346624A-96FD-C09B-ED00-B12C2B71EA95}"/>
+          </ac:picMkLst>
+        </pc:picChg>
+      </pc:sldChg>
+      <pc:sldChg chg="addSp delSp modSp add mod">
+        <pc:chgData name="Abdelrahman Al-Khawas" userId="3f2c01cd7d0cacd7" providerId="LiveId" clId="{EB3B49F8-6F6D-4A54-AE48-A6ED5CF23A6F}" dt="2024-11-01T08:13:53.471" v="526" actId="1076"/>
+        <pc:sldMkLst>
+          <pc:docMk/>
+          <pc:sldMk cId="3838532362" sldId="277"/>
+        </pc:sldMkLst>
+        <pc:spChg chg="del">
+          <ac:chgData name="Abdelrahman Al-Khawas" userId="3f2c01cd7d0cacd7" providerId="LiveId" clId="{EB3B49F8-6F6D-4A54-AE48-A6ED5CF23A6F}" dt="2024-11-01T08:13:43.993" v="521"/>
+          <ac:spMkLst>
+            <pc:docMk/>
+            <pc:sldMk cId="3838532362" sldId="277"/>
+            <ac:spMk id="3" creationId="{1B1BADA1-0FD7-5263-621D-1C1E8705F6C8}"/>
+          </ac:spMkLst>
+        </pc:spChg>
+        <pc:picChg chg="add mod">
+          <ac:chgData name="Abdelrahman Al-Khawas" userId="3f2c01cd7d0cacd7" providerId="LiveId" clId="{EB3B49F8-6F6D-4A54-AE48-A6ED5CF23A6F}" dt="2024-11-01T08:13:53.471" v="526" actId="1076"/>
+          <ac:picMkLst>
+            <pc:docMk/>
+            <pc:sldMk cId="3838532362" sldId="277"/>
+            <ac:picMk id="5" creationId="{EC3F4037-1DE4-64C1-27BA-EE618D6425AF}"/>
+          </ac:picMkLst>
+        </pc:picChg>
       </pc:sldChg>
     </pc:docChg>
   </pc:docChgLst>
@@ -287,7 +791,7 @@
           <a:p>
             <a:fld id="{E7B1F2D1-9796-4992-866C-CC19904FEB4A}" type="datetimeFigureOut">
               <a:rPr lang="en-US" smtClean="0"/>
-              <a:t>10/29/2024</a:t>
+              <a:t>11/1/2024</a:t>
             </a:fld>
             <a:endParaRPr lang="en-US"/>
           </a:p>
@@ -701,7 +1205,7 @@
           <a:p>
             <a:fld id="{B5529351-723B-4172-B48F-3D859D25D45E}" type="datetimeFigureOut">
               <a:rPr lang="en-US" smtClean="0"/>
-              <a:t>10/29/2024</a:t>
+              <a:t>11/1/2024</a:t>
             </a:fld>
             <a:endParaRPr lang="en-US"/>
           </a:p>
@@ -899,7 +1403,7 @@
           <a:p>
             <a:fld id="{B5529351-723B-4172-B48F-3D859D25D45E}" type="datetimeFigureOut">
               <a:rPr lang="en-US" smtClean="0"/>
-              <a:t>10/29/2024</a:t>
+              <a:t>11/1/2024</a:t>
             </a:fld>
             <a:endParaRPr lang="en-US"/>
           </a:p>
@@ -1107,7 +1611,7 @@
           <a:p>
             <a:fld id="{B5529351-723B-4172-B48F-3D859D25D45E}" type="datetimeFigureOut">
               <a:rPr lang="en-US" smtClean="0"/>
-              <a:t>10/29/2024</a:t>
+              <a:t>11/1/2024</a:t>
             </a:fld>
             <a:endParaRPr lang="en-US"/>
           </a:p>
@@ -1305,7 +1809,7 @@
           <a:p>
             <a:fld id="{B5529351-723B-4172-B48F-3D859D25D45E}" type="datetimeFigureOut">
               <a:rPr lang="en-US" smtClean="0"/>
-              <a:t>10/29/2024</a:t>
+              <a:t>11/1/2024</a:t>
             </a:fld>
             <a:endParaRPr lang="en-US"/>
           </a:p>
@@ -1580,7 +2084,7 @@
           <a:p>
             <a:fld id="{B5529351-723B-4172-B48F-3D859D25D45E}" type="datetimeFigureOut">
               <a:rPr lang="en-US" smtClean="0"/>
-              <a:t>10/29/2024</a:t>
+              <a:t>11/1/2024</a:t>
             </a:fld>
             <a:endParaRPr lang="en-US"/>
           </a:p>
@@ -1845,7 +2349,7 @@
           <a:p>
             <a:fld id="{B5529351-723B-4172-B48F-3D859D25D45E}" type="datetimeFigureOut">
               <a:rPr lang="en-US" smtClean="0"/>
-              <a:t>10/29/2024</a:t>
+              <a:t>11/1/2024</a:t>
             </a:fld>
             <a:endParaRPr lang="en-US"/>
           </a:p>
@@ -2257,7 +2761,7 @@
           <a:p>
             <a:fld id="{B5529351-723B-4172-B48F-3D859D25D45E}" type="datetimeFigureOut">
               <a:rPr lang="en-US" smtClean="0"/>
-              <a:t>10/29/2024</a:t>
+              <a:t>11/1/2024</a:t>
             </a:fld>
             <a:endParaRPr lang="en-US"/>
           </a:p>
@@ -2398,7 +2902,7 @@
           <a:p>
             <a:fld id="{B5529351-723B-4172-B48F-3D859D25D45E}" type="datetimeFigureOut">
               <a:rPr lang="en-US" smtClean="0"/>
-              <a:t>10/29/2024</a:t>
+              <a:t>11/1/2024</a:t>
             </a:fld>
             <a:endParaRPr lang="en-US"/>
           </a:p>
@@ -2511,7 +3015,7 @@
           <a:p>
             <a:fld id="{B5529351-723B-4172-B48F-3D859D25D45E}" type="datetimeFigureOut">
               <a:rPr lang="en-US" smtClean="0"/>
-              <a:t>10/29/2024</a:t>
+              <a:t>11/1/2024</a:t>
             </a:fld>
             <a:endParaRPr lang="en-US"/>
           </a:p>
@@ -2822,7 +3326,7 @@
           <a:p>
             <a:fld id="{B5529351-723B-4172-B48F-3D859D25D45E}" type="datetimeFigureOut">
               <a:rPr lang="en-US" smtClean="0"/>
-              <a:t>10/29/2024</a:t>
+              <a:t>11/1/2024</a:t>
             </a:fld>
             <a:endParaRPr lang="en-US"/>
           </a:p>
@@ -3110,7 +3614,7 @@
           <a:p>
             <a:fld id="{B5529351-723B-4172-B48F-3D859D25D45E}" type="datetimeFigureOut">
               <a:rPr lang="en-US" smtClean="0"/>
-              <a:t>10/29/2024</a:t>
+              <a:t>11/1/2024</a:t>
             </a:fld>
             <a:endParaRPr lang="en-US"/>
           </a:p>
@@ -3351,7 +3855,7 @@
           <a:p>
             <a:fld id="{B5529351-723B-4172-B48F-3D859D25D45E}" type="datetimeFigureOut">
               <a:rPr lang="en-US" smtClean="0"/>
-              <a:t>10/29/2024</a:t>
+              <a:t>11/1/2024</a:t>
             </a:fld>
             <a:endParaRPr lang="en-US"/>
           </a:p>
@@ -3838,6 +4342,897 @@
 </p:sld>
 </file>
 
+<file path=ppt/slides/slide10.xml><?xml version="1.0" encoding="utf-8"?>
+<p:sld xmlns:a="http://schemas.openxmlformats.org/drawingml/2006/main" xmlns:r="http://schemas.openxmlformats.org/officeDocument/2006/relationships" xmlns:p="http://schemas.openxmlformats.org/presentationml/2006/main">
+  <p:cSld>
+    <p:spTree>
+      <p:nvGrpSpPr>
+        <p:cNvPr id="1" name=""/>
+        <p:cNvGrpSpPr/>
+        <p:nvPr/>
+      </p:nvGrpSpPr>
+      <p:grpSpPr>
+        <a:xfrm>
+          <a:off x="0" y="0"/>
+          <a:ext cx="0" cy="0"/>
+          <a:chOff x="0" y="0"/>
+          <a:chExt cx="0" cy="0"/>
+        </a:xfrm>
+      </p:grpSpPr>
+      <p:sp>
+        <p:nvSpPr>
+          <p:cNvPr id="2" name="Title 1">
+            <a:extLst>
+              <a:ext uri="{FF2B5EF4-FFF2-40B4-BE49-F238E27FC236}">
+                <a16:creationId xmlns:a16="http://schemas.microsoft.com/office/drawing/2014/main" id="{457026EC-0160-905A-03B0-28793AC2CD47}"/>
+              </a:ext>
+            </a:extLst>
+          </p:cNvPr>
+          <p:cNvSpPr>
+            <a:spLocks noGrp="1"/>
+          </p:cNvSpPr>
+          <p:nvPr>
+            <p:ph type="title"/>
+          </p:nvPr>
+        </p:nvSpPr>
+        <p:spPr/>
+        <p:txBody>
+          <a:bodyPr/>
+          <a:lstStyle/>
+          <a:p>
+            <a:endParaRPr lang="en-US"/>
+          </a:p>
+        </p:txBody>
+      </p:sp>
+      <p:pic>
+        <p:nvPicPr>
+          <p:cNvPr id="9" name="Content Placeholder 8" descr="A screenshot of a graph&#10;&#10;Description automatically generated">
+            <a:extLst>
+              <a:ext uri="{FF2B5EF4-FFF2-40B4-BE49-F238E27FC236}">
+                <a16:creationId xmlns:a16="http://schemas.microsoft.com/office/drawing/2014/main" id="{29BC4C35-5C34-10A6-F2EA-ED58BC867609}"/>
+              </a:ext>
+            </a:extLst>
+          </p:cNvPr>
+          <p:cNvPicPr>
+            <a:picLocks noGrp="1" noChangeAspect="1"/>
+          </p:cNvPicPr>
+          <p:nvPr>
+            <p:ph idx="1"/>
+          </p:nvPr>
+        </p:nvPicPr>
+        <p:blipFill>
+          <a:blip r:embed="rId2">
+            <a:extLst>
+              <a:ext uri="{28A0092B-C50C-407E-A947-70E740481C1C}">
+                <a14:useLocalDpi xmlns:a14="http://schemas.microsoft.com/office/drawing/2010/main" val="0"/>
+              </a:ext>
+            </a:extLst>
+          </a:blip>
+          <a:stretch>
+            <a:fillRect/>
+          </a:stretch>
+        </p:blipFill>
+        <p:spPr>
+          <a:xfrm>
+            <a:off x="952500" y="0"/>
+            <a:ext cx="10287000" cy="6858000"/>
+          </a:xfrm>
+        </p:spPr>
+      </p:pic>
+    </p:spTree>
+    <p:extLst>
+      <p:ext uri="{BB962C8B-B14F-4D97-AF65-F5344CB8AC3E}">
+        <p14:creationId xmlns:p14="http://schemas.microsoft.com/office/powerpoint/2010/main" val="63888143"/>
+      </p:ext>
+    </p:extLst>
+  </p:cSld>
+  <p:clrMapOvr>
+    <a:masterClrMapping/>
+  </p:clrMapOvr>
+</p:sld>
+</file>
+
+<file path=ppt/slides/slide11.xml><?xml version="1.0" encoding="utf-8"?>
+<p:sld xmlns:a="http://schemas.openxmlformats.org/drawingml/2006/main" xmlns:r="http://schemas.openxmlformats.org/officeDocument/2006/relationships" xmlns:p="http://schemas.openxmlformats.org/presentationml/2006/main">
+  <p:cSld>
+    <p:spTree>
+      <p:nvGrpSpPr>
+        <p:cNvPr id="1" name=""/>
+        <p:cNvGrpSpPr/>
+        <p:nvPr/>
+      </p:nvGrpSpPr>
+      <p:grpSpPr>
+        <a:xfrm>
+          <a:off x="0" y="0"/>
+          <a:ext cx="0" cy="0"/>
+          <a:chOff x="0" y="0"/>
+          <a:chExt cx="0" cy="0"/>
+        </a:xfrm>
+      </p:grpSpPr>
+      <p:sp>
+        <p:nvSpPr>
+          <p:cNvPr id="2" name="Title 1">
+            <a:extLst>
+              <a:ext uri="{FF2B5EF4-FFF2-40B4-BE49-F238E27FC236}">
+                <a16:creationId xmlns:a16="http://schemas.microsoft.com/office/drawing/2014/main" id="{BDC166E5-66A7-6300-3CDA-AA247F4C1744}"/>
+              </a:ext>
+            </a:extLst>
+          </p:cNvPr>
+          <p:cNvSpPr>
+            <a:spLocks noGrp="1"/>
+          </p:cNvSpPr>
+          <p:nvPr>
+            <p:ph type="title"/>
+          </p:nvPr>
+        </p:nvSpPr>
+        <p:spPr/>
+        <p:txBody>
+          <a:bodyPr/>
+          <a:lstStyle/>
+          <a:p>
+            <a:endParaRPr lang="en-US"/>
+          </a:p>
+        </p:txBody>
+      </p:sp>
+      <p:pic>
+        <p:nvPicPr>
+          <p:cNvPr id="5" name="Content Placeholder 4" descr="A screenshot of a graph&#10;&#10;Description automatically generated">
+            <a:extLst>
+              <a:ext uri="{FF2B5EF4-FFF2-40B4-BE49-F238E27FC236}">
+                <a16:creationId xmlns:a16="http://schemas.microsoft.com/office/drawing/2014/main" id="{47278FC5-8997-14D0-85F8-91B9A8588A92}"/>
+              </a:ext>
+            </a:extLst>
+          </p:cNvPr>
+          <p:cNvPicPr>
+            <a:picLocks noGrp="1" noChangeAspect="1"/>
+          </p:cNvPicPr>
+          <p:nvPr>
+            <p:ph idx="1"/>
+          </p:nvPr>
+        </p:nvPicPr>
+        <p:blipFill>
+          <a:blip r:embed="rId2">
+            <a:extLst>
+              <a:ext uri="{28A0092B-C50C-407E-A947-70E740481C1C}">
+                <a14:useLocalDpi xmlns:a14="http://schemas.microsoft.com/office/drawing/2010/main" val="0"/>
+              </a:ext>
+            </a:extLst>
+          </a:blip>
+          <a:stretch>
+            <a:fillRect/>
+          </a:stretch>
+        </p:blipFill>
+        <p:spPr>
+          <a:xfrm>
+            <a:off x="949522" y="0"/>
+            <a:ext cx="10292955" cy="6861970"/>
+          </a:xfrm>
+        </p:spPr>
+      </p:pic>
+    </p:spTree>
+    <p:extLst>
+      <p:ext uri="{BB962C8B-B14F-4D97-AF65-F5344CB8AC3E}">
+        <p14:creationId xmlns:p14="http://schemas.microsoft.com/office/powerpoint/2010/main" val="3274303137"/>
+      </p:ext>
+    </p:extLst>
+  </p:cSld>
+  <p:clrMapOvr>
+    <a:masterClrMapping/>
+  </p:clrMapOvr>
+</p:sld>
+</file>
+
+<file path=ppt/slides/slide12.xml><?xml version="1.0" encoding="utf-8"?>
+<p:sld xmlns:a="http://schemas.openxmlformats.org/drawingml/2006/main" xmlns:r="http://schemas.openxmlformats.org/officeDocument/2006/relationships" xmlns:p="http://schemas.openxmlformats.org/presentationml/2006/main">
+  <p:cSld>
+    <p:spTree>
+      <p:nvGrpSpPr>
+        <p:cNvPr id="1" name=""/>
+        <p:cNvGrpSpPr/>
+        <p:nvPr/>
+      </p:nvGrpSpPr>
+      <p:grpSpPr>
+        <a:xfrm>
+          <a:off x="0" y="0"/>
+          <a:ext cx="0" cy="0"/>
+          <a:chOff x="0" y="0"/>
+          <a:chExt cx="0" cy="0"/>
+        </a:xfrm>
+      </p:grpSpPr>
+      <p:sp>
+        <p:nvSpPr>
+          <p:cNvPr id="2" name="Title 1">
+            <a:extLst>
+              <a:ext uri="{FF2B5EF4-FFF2-40B4-BE49-F238E27FC236}">
+                <a16:creationId xmlns:a16="http://schemas.microsoft.com/office/drawing/2014/main" id="{5B0834BB-4691-5A33-E788-DA099D0AAD81}"/>
+              </a:ext>
+            </a:extLst>
+          </p:cNvPr>
+          <p:cNvSpPr>
+            <a:spLocks noGrp="1"/>
+          </p:cNvSpPr>
+          <p:nvPr>
+            <p:ph type="title"/>
+          </p:nvPr>
+        </p:nvSpPr>
+        <p:spPr/>
+        <p:txBody>
+          <a:bodyPr/>
+          <a:lstStyle/>
+          <a:p>
+            <a:endParaRPr lang="en-US"/>
+          </a:p>
+        </p:txBody>
+      </p:sp>
+      <p:pic>
+        <p:nvPicPr>
+          <p:cNvPr id="7" name="Content Placeholder 6" descr="A screen shot of a graph&#10;&#10;Description automatically generated">
+            <a:extLst>
+              <a:ext uri="{FF2B5EF4-FFF2-40B4-BE49-F238E27FC236}">
+                <a16:creationId xmlns:a16="http://schemas.microsoft.com/office/drawing/2014/main" id="{3C90785C-1287-1481-9DEE-244004107234}"/>
+              </a:ext>
+            </a:extLst>
+          </p:cNvPr>
+          <p:cNvPicPr>
+            <a:picLocks noGrp="1" noChangeAspect="1"/>
+          </p:cNvPicPr>
+          <p:nvPr>
+            <p:ph idx="1"/>
+          </p:nvPr>
+        </p:nvPicPr>
+        <p:blipFill>
+          <a:blip r:embed="rId2">
+            <a:extLst>
+              <a:ext uri="{28A0092B-C50C-407E-A947-70E740481C1C}">
+                <a14:useLocalDpi xmlns:a14="http://schemas.microsoft.com/office/drawing/2010/main" val="0"/>
+              </a:ext>
+            </a:extLst>
+          </a:blip>
+          <a:stretch>
+            <a:fillRect/>
+          </a:stretch>
+        </p:blipFill>
+        <p:spPr>
+          <a:xfrm>
+            <a:off x="952500" y="0"/>
+            <a:ext cx="10287000" cy="6858000"/>
+          </a:xfrm>
+        </p:spPr>
+      </p:pic>
+    </p:spTree>
+    <p:extLst>
+      <p:ext uri="{BB962C8B-B14F-4D97-AF65-F5344CB8AC3E}">
+        <p14:creationId xmlns:p14="http://schemas.microsoft.com/office/powerpoint/2010/main" val="2643263005"/>
+      </p:ext>
+    </p:extLst>
+  </p:cSld>
+  <p:clrMapOvr>
+    <a:masterClrMapping/>
+  </p:clrMapOvr>
+</p:sld>
+</file>
+
+<file path=ppt/slides/slide13.xml><?xml version="1.0" encoding="utf-8"?>
+<p:sld xmlns:a="http://schemas.openxmlformats.org/drawingml/2006/main" xmlns:r="http://schemas.openxmlformats.org/officeDocument/2006/relationships" xmlns:p="http://schemas.openxmlformats.org/presentationml/2006/main">
+  <p:cSld>
+    <p:spTree>
+      <p:nvGrpSpPr>
+        <p:cNvPr id="1" name=""/>
+        <p:cNvGrpSpPr/>
+        <p:nvPr/>
+      </p:nvGrpSpPr>
+      <p:grpSpPr>
+        <a:xfrm>
+          <a:off x="0" y="0"/>
+          <a:ext cx="0" cy="0"/>
+          <a:chOff x="0" y="0"/>
+          <a:chExt cx="0" cy="0"/>
+        </a:xfrm>
+      </p:grpSpPr>
+      <p:sp>
+        <p:nvSpPr>
+          <p:cNvPr id="4" name="Title 3">
+            <a:extLst>
+              <a:ext uri="{FF2B5EF4-FFF2-40B4-BE49-F238E27FC236}">
+                <a16:creationId xmlns:a16="http://schemas.microsoft.com/office/drawing/2014/main" id="{BA41BCA8-6AFF-C960-1E82-15CC6656DD44}"/>
+              </a:ext>
+            </a:extLst>
+          </p:cNvPr>
+          <p:cNvSpPr>
+            <a:spLocks noGrp="1"/>
+          </p:cNvSpPr>
+          <p:nvPr>
+            <p:ph type="ctrTitle"/>
+          </p:nvPr>
+        </p:nvSpPr>
+        <p:spPr/>
+        <p:txBody>
+          <a:bodyPr/>
+          <a:lstStyle/>
+          <a:p>
+            <a:r>
+              <a:rPr lang="en-US" dirty="0"/>
+              <a:t>dribblers</a:t>
+            </a:r>
+          </a:p>
+        </p:txBody>
+      </p:sp>
+      <p:sp>
+        <p:nvSpPr>
+          <p:cNvPr id="5" name="Subtitle 4">
+            <a:extLst>
+              <a:ext uri="{FF2B5EF4-FFF2-40B4-BE49-F238E27FC236}">
+                <a16:creationId xmlns:a16="http://schemas.microsoft.com/office/drawing/2014/main" id="{14D1FBA7-6B77-9CE3-67A8-1BDACB3E55B5}"/>
+              </a:ext>
+            </a:extLst>
+          </p:cNvPr>
+          <p:cNvSpPr>
+            <a:spLocks noGrp="1"/>
+          </p:cNvSpPr>
+          <p:nvPr>
+            <p:ph type="subTitle" idx="1"/>
+          </p:nvPr>
+        </p:nvSpPr>
+        <p:spPr/>
+        <p:txBody>
+          <a:bodyPr/>
+          <a:lstStyle/>
+          <a:p>
+            <a:endParaRPr lang="en-US"/>
+          </a:p>
+        </p:txBody>
+      </p:sp>
+    </p:spTree>
+    <p:extLst>
+      <p:ext uri="{BB962C8B-B14F-4D97-AF65-F5344CB8AC3E}">
+        <p14:creationId xmlns:p14="http://schemas.microsoft.com/office/powerpoint/2010/main" val="1590635831"/>
+      </p:ext>
+    </p:extLst>
+  </p:cSld>
+  <p:clrMapOvr>
+    <a:masterClrMapping/>
+  </p:clrMapOvr>
+</p:sld>
+</file>
+
+<file path=ppt/slides/slide14.xml><?xml version="1.0" encoding="utf-8"?>
+<p:sld xmlns:a="http://schemas.openxmlformats.org/drawingml/2006/main" xmlns:r="http://schemas.openxmlformats.org/officeDocument/2006/relationships" xmlns:p="http://schemas.openxmlformats.org/presentationml/2006/main">
+  <p:cSld>
+    <p:spTree>
+      <p:nvGrpSpPr>
+        <p:cNvPr id="1" name=""/>
+        <p:cNvGrpSpPr/>
+        <p:nvPr/>
+      </p:nvGrpSpPr>
+      <p:grpSpPr>
+        <a:xfrm>
+          <a:off x="0" y="0"/>
+          <a:ext cx="0" cy="0"/>
+          <a:chOff x="0" y="0"/>
+          <a:chExt cx="0" cy="0"/>
+        </a:xfrm>
+      </p:grpSpPr>
+      <p:sp>
+        <p:nvSpPr>
+          <p:cNvPr id="2" name="Title 1">
+            <a:extLst>
+              <a:ext uri="{FF2B5EF4-FFF2-40B4-BE49-F238E27FC236}">
+                <a16:creationId xmlns:a16="http://schemas.microsoft.com/office/drawing/2014/main" id="{AB8E15D6-3F6F-731F-E748-9B2E44573FBE}"/>
+              </a:ext>
+            </a:extLst>
+          </p:cNvPr>
+          <p:cNvSpPr>
+            <a:spLocks noGrp="1"/>
+          </p:cNvSpPr>
+          <p:nvPr>
+            <p:ph type="title"/>
+          </p:nvPr>
+        </p:nvSpPr>
+        <p:spPr/>
+        <p:txBody>
+          <a:bodyPr/>
+          <a:lstStyle/>
+          <a:p>
+            <a:endParaRPr lang="en-US"/>
+          </a:p>
+        </p:txBody>
+      </p:sp>
+      <p:pic>
+        <p:nvPicPr>
+          <p:cNvPr id="5" name="Content Placeholder 4" descr="A graph with many colored dots&#10;&#10;Description automatically generated">
+            <a:extLst>
+              <a:ext uri="{FF2B5EF4-FFF2-40B4-BE49-F238E27FC236}">
+                <a16:creationId xmlns:a16="http://schemas.microsoft.com/office/drawing/2014/main" id="{188DCE11-6712-DC1F-C5C7-1A7D6D83B7FB}"/>
+              </a:ext>
+            </a:extLst>
+          </p:cNvPr>
+          <p:cNvPicPr>
+            <a:picLocks noGrp="1" noChangeAspect="1"/>
+          </p:cNvPicPr>
+          <p:nvPr>
+            <p:ph idx="1"/>
+          </p:nvPr>
+        </p:nvPicPr>
+        <p:blipFill>
+          <a:blip r:embed="rId2">
+            <a:extLst>
+              <a:ext uri="{28A0092B-C50C-407E-A947-70E740481C1C}">
+                <a14:useLocalDpi xmlns:a14="http://schemas.microsoft.com/office/drawing/2010/main" val="0"/>
+              </a:ext>
+            </a:extLst>
+          </a:blip>
+          <a:stretch>
+            <a:fillRect/>
+          </a:stretch>
+        </p:blipFill>
+        <p:spPr>
+          <a:xfrm>
+            <a:off x="952499" y="0"/>
+            <a:ext cx="10287001" cy="6858000"/>
+          </a:xfrm>
+        </p:spPr>
+      </p:pic>
+    </p:spTree>
+    <p:extLst>
+      <p:ext uri="{BB962C8B-B14F-4D97-AF65-F5344CB8AC3E}">
+        <p14:creationId xmlns:p14="http://schemas.microsoft.com/office/powerpoint/2010/main" val="499973568"/>
+      </p:ext>
+    </p:extLst>
+  </p:cSld>
+  <p:clrMapOvr>
+    <a:masterClrMapping/>
+  </p:clrMapOvr>
+</p:sld>
+</file>
+
+<file path=ppt/slides/slide15.xml><?xml version="1.0" encoding="utf-8"?>
+<p:sld xmlns:a="http://schemas.openxmlformats.org/drawingml/2006/main" xmlns:r="http://schemas.openxmlformats.org/officeDocument/2006/relationships" xmlns:p="http://schemas.openxmlformats.org/presentationml/2006/main">
+  <p:cSld>
+    <p:spTree>
+      <p:nvGrpSpPr>
+        <p:cNvPr id="1" name=""/>
+        <p:cNvGrpSpPr/>
+        <p:nvPr/>
+      </p:nvGrpSpPr>
+      <p:grpSpPr>
+        <a:xfrm>
+          <a:off x="0" y="0"/>
+          <a:ext cx="0" cy="0"/>
+          <a:chOff x="0" y="0"/>
+          <a:chExt cx="0" cy="0"/>
+        </a:xfrm>
+      </p:grpSpPr>
+      <p:sp>
+        <p:nvSpPr>
+          <p:cNvPr id="2" name="Title 1">
+            <a:extLst>
+              <a:ext uri="{FF2B5EF4-FFF2-40B4-BE49-F238E27FC236}">
+                <a16:creationId xmlns:a16="http://schemas.microsoft.com/office/drawing/2014/main" id="{6AE9EED7-CEDE-FD82-8DC7-9BC7A7C8D57F}"/>
+              </a:ext>
+            </a:extLst>
+          </p:cNvPr>
+          <p:cNvSpPr>
+            <a:spLocks noGrp="1"/>
+          </p:cNvSpPr>
+          <p:nvPr>
+            <p:ph type="title"/>
+          </p:nvPr>
+        </p:nvSpPr>
+        <p:spPr/>
+        <p:txBody>
+          <a:bodyPr/>
+          <a:lstStyle/>
+          <a:p>
+            <a:endParaRPr lang="en-US"/>
+          </a:p>
+        </p:txBody>
+      </p:sp>
+      <p:pic>
+        <p:nvPicPr>
+          <p:cNvPr id="5" name="Content Placeholder 4" descr="A screen shot of a graph&#10;&#10;Description automatically generated">
+            <a:extLst>
+              <a:ext uri="{FF2B5EF4-FFF2-40B4-BE49-F238E27FC236}">
+                <a16:creationId xmlns:a16="http://schemas.microsoft.com/office/drawing/2014/main" id="{EECCB797-1EB9-1501-CD3A-787F6051890B}"/>
+              </a:ext>
+            </a:extLst>
+          </p:cNvPr>
+          <p:cNvPicPr>
+            <a:picLocks noGrp="1" noChangeAspect="1"/>
+          </p:cNvPicPr>
+          <p:nvPr>
+            <p:ph idx="1"/>
+          </p:nvPr>
+        </p:nvPicPr>
+        <p:blipFill>
+          <a:blip r:embed="rId2">
+            <a:extLst>
+              <a:ext uri="{28A0092B-C50C-407E-A947-70E740481C1C}">
+                <a14:useLocalDpi xmlns:a14="http://schemas.microsoft.com/office/drawing/2010/main" val="0"/>
+              </a:ext>
+            </a:extLst>
+          </a:blip>
+          <a:stretch>
+            <a:fillRect/>
+          </a:stretch>
+        </p:blipFill>
+        <p:spPr>
+          <a:xfrm>
+            <a:off x="952499" y="0"/>
+            <a:ext cx="10287001" cy="6858000"/>
+          </a:xfrm>
+        </p:spPr>
+      </p:pic>
+    </p:spTree>
+    <p:extLst>
+      <p:ext uri="{BB962C8B-B14F-4D97-AF65-F5344CB8AC3E}">
+        <p14:creationId xmlns:p14="http://schemas.microsoft.com/office/powerpoint/2010/main" val="3835704787"/>
+      </p:ext>
+    </p:extLst>
+  </p:cSld>
+  <p:clrMapOvr>
+    <a:masterClrMapping/>
+  </p:clrMapOvr>
+</p:sld>
+</file>
+
+<file path=ppt/slides/slide16.xml><?xml version="1.0" encoding="utf-8"?>
+<p:sld xmlns:a="http://schemas.openxmlformats.org/drawingml/2006/main" xmlns:r="http://schemas.openxmlformats.org/officeDocument/2006/relationships" xmlns:p="http://schemas.openxmlformats.org/presentationml/2006/main">
+  <p:cSld>
+    <p:spTree>
+      <p:nvGrpSpPr>
+        <p:cNvPr id="1" name=""/>
+        <p:cNvGrpSpPr/>
+        <p:nvPr/>
+      </p:nvGrpSpPr>
+      <p:grpSpPr>
+        <a:xfrm>
+          <a:off x="0" y="0"/>
+          <a:ext cx="0" cy="0"/>
+          <a:chOff x="0" y="0"/>
+          <a:chExt cx="0" cy="0"/>
+        </a:xfrm>
+      </p:grpSpPr>
+      <p:sp>
+        <p:nvSpPr>
+          <p:cNvPr id="4" name="Title 3">
+            <a:extLst>
+              <a:ext uri="{FF2B5EF4-FFF2-40B4-BE49-F238E27FC236}">
+                <a16:creationId xmlns:a16="http://schemas.microsoft.com/office/drawing/2014/main" id="{F81C79BC-C1B6-1FA8-B564-6BFFC82FCC3A}"/>
+              </a:ext>
+            </a:extLst>
+          </p:cNvPr>
+          <p:cNvSpPr>
+            <a:spLocks noGrp="1"/>
+          </p:cNvSpPr>
+          <p:nvPr>
+            <p:ph type="ctrTitle"/>
+          </p:nvPr>
+        </p:nvSpPr>
+        <p:spPr/>
+        <p:txBody>
+          <a:bodyPr/>
+          <a:lstStyle/>
+          <a:p>
+            <a:r>
+              <a:rPr lang="en-US" dirty="0"/>
+              <a:t>passers</a:t>
+            </a:r>
+          </a:p>
+        </p:txBody>
+      </p:sp>
+      <p:sp>
+        <p:nvSpPr>
+          <p:cNvPr id="5" name="Subtitle 4">
+            <a:extLst>
+              <a:ext uri="{FF2B5EF4-FFF2-40B4-BE49-F238E27FC236}">
+                <a16:creationId xmlns:a16="http://schemas.microsoft.com/office/drawing/2014/main" id="{26A0638C-A51F-497D-37D6-66B9C1CC7441}"/>
+              </a:ext>
+            </a:extLst>
+          </p:cNvPr>
+          <p:cNvSpPr>
+            <a:spLocks noGrp="1"/>
+          </p:cNvSpPr>
+          <p:nvPr>
+            <p:ph type="subTitle" idx="1"/>
+          </p:nvPr>
+        </p:nvSpPr>
+        <p:spPr/>
+        <p:txBody>
+          <a:bodyPr/>
+          <a:lstStyle/>
+          <a:p>
+            <a:endParaRPr lang="en-US"/>
+          </a:p>
+        </p:txBody>
+      </p:sp>
+    </p:spTree>
+    <p:extLst>
+      <p:ext uri="{BB962C8B-B14F-4D97-AF65-F5344CB8AC3E}">
+        <p14:creationId xmlns:p14="http://schemas.microsoft.com/office/powerpoint/2010/main" val="3631412117"/>
+      </p:ext>
+    </p:extLst>
+  </p:cSld>
+  <p:clrMapOvr>
+    <a:masterClrMapping/>
+  </p:clrMapOvr>
+</p:sld>
+</file>
+
+<file path=ppt/slides/slide17.xml><?xml version="1.0" encoding="utf-8"?>
+<p:sld xmlns:a="http://schemas.openxmlformats.org/drawingml/2006/main" xmlns:r="http://schemas.openxmlformats.org/officeDocument/2006/relationships" xmlns:p="http://schemas.openxmlformats.org/presentationml/2006/main">
+  <p:cSld>
+    <p:spTree>
+      <p:nvGrpSpPr>
+        <p:cNvPr id="1" name=""/>
+        <p:cNvGrpSpPr/>
+        <p:nvPr/>
+      </p:nvGrpSpPr>
+      <p:grpSpPr>
+        <a:xfrm>
+          <a:off x="0" y="0"/>
+          <a:ext cx="0" cy="0"/>
+          <a:chOff x="0" y="0"/>
+          <a:chExt cx="0" cy="0"/>
+        </a:xfrm>
+      </p:grpSpPr>
+      <p:sp>
+        <p:nvSpPr>
+          <p:cNvPr id="2" name="Title 1">
+            <a:extLst>
+              <a:ext uri="{FF2B5EF4-FFF2-40B4-BE49-F238E27FC236}">
+                <a16:creationId xmlns:a16="http://schemas.microsoft.com/office/drawing/2014/main" id="{0BB08888-1811-83C1-508E-ECAC0DA49A1B}"/>
+              </a:ext>
+            </a:extLst>
+          </p:cNvPr>
+          <p:cNvSpPr>
+            <a:spLocks noGrp="1"/>
+          </p:cNvSpPr>
+          <p:nvPr>
+            <p:ph type="title"/>
+          </p:nvPr>
+        </p:nvSpPr>
+        <p:spPr/>
+        <p:txBody>
+          <a:bodyPr/>
+          <a:lstStyle/>
+          <a:p>
+            <a:endParaRPr lang="en-US"/>
+          </a:p>
+        </p:txBody>
+      </p:sp>
+      <p:pic>
+        <p:nvPicPr>
+          <p:cNvPr id="5" name="Content Placeholder 4" descr="A screenshot of a graph&#10;&#10;Description automatically generated">
+            <a:extLst>
+              <a:ext uri="{FF2B5EF4-FFF2-40B4-BE49-F238E27FC236}">
+                <a16:creationId xmlns:a16="http://schemas.microsoft.com/office/drawing/2014/main" id="{8970DC13-56AC-4AAD-F722-D21DA766C4AC}"/>
+              </a:ext>
+            </a:extLst>
+          </p:cNvPr>
+          <p:cNvPicPr>
+            <a:picLocks noGrp="1" noChangeAspect="1"/>
+          </p:cNvPicPr>
+          <p:nvPr>
+            <p:ph idx="1"/>
+          </p:nvPr>
+        </p:nvPicPr>
+        <p:blipFill>
+          <a:blip r:embed="rId2">
+            <a:extLst>
+              <a:ext uri="{28A0092B-C50C-407E-A947-70E740481C1C}">
+                <a14:useLocalDpi xmlns:a14="http://schemas.microsoft.com/office/drawing/2010/main" val="0"/>
+              </a:ext>
+            </a:extLst>
+          </a:blip>
+          <a:stretch>
+            <a:fillRect/>
+          </a:stretch>
+        </p:blipFill>
+        <p:spPr>
+          <a:xfrm>
+            <a:off x="952499" y="0"/>
+            <a:ext cx="10287001" cy="6858000"/>
+          </a:xfrm>
+        </p:spPr>
+      </p:pic>
+    </p:spTree>
+    <p:extLst>
+      <p:ext uri="{BB962C8B-B14F-4D97-AF65-F5344CB8AC3E}">
+        <p14:creationId xmlns:p14="http://schemas.microsoft.com/office/powerpoint/2010/main" val="3602922579"/>
+      </p:ext>
+    </p:extLst>
+  </p:cSld>
+  <p:clrMapOvr>
+    <a:masterClrMapping/>
+  </p:clrMapOvr>
+</p:sld>
+</file>
+
+<file path=ppt/slides/slide18.xml><?xml version="1.0" encoding="utf-8"?>
+<p:sld xmlns:a="http://schemas.openxmlformats.org/drawingml/2006/main" xmlns:r="http://schemas.openxmlformats.org/officeDocument/2006/relationships" xmlns:p="http://schemas.openxmlformats.org/presentationml/2006/main">
+  <p:cSld>
+    <p:spTree>
+      <p:nvGrpSpPr>
+        <p:cNvPr id="1" name="">
+          <a:extLst>
+            <a:ext uri="{FF2B5EF4-FFF2-40B4-BE49-F238E27FC236}">
+              <a16:creationId xmlns:a16="http://schemas.microsoft.com/office/drawing/2014/main" id="{55E9F282-576B-EE42-E9A3-EA56E61E1DD0}"/>
+            </a:ext>
+          </a:extLst>
+        </p:cNvPr>
+        <p:cNvGrpSpPr/>
+        <p:nvPr/>
+      </p:nvGrpSpPr>
+      <p:grpSpPr>
+        <a:xfrm>
+          <a:off x="0" y="0"/>
+          <a:ext cx="0" cy="0"/>
+          <a:chOff x="0" y="0"/>
+          <a:chExt cx="0" cy="0"/>
+        </a:xfrm>
+      </p:grpSpPr>
+      <p:sp>
+        <p:nvSpPr>
+          <p:cNvPr id="2" name="Title 1">
+            <a:extLst>
+              <a:ext uri="{FF2B5EF4-FFF2-40B4-BE49-F238E27FC236}">
+                <a16:creationId xmlns:a16="http://schemas.microsoft.com/office/drawing/2014/main" id="{20467189-9C1F-36EF-3CDD-836A90791B0C}"/>
+              </a:ext>
+            </a:extLst>
+          </p:cNvPr>
+          <p:cNvSpPr>
+            <a:spLocks noGrp="1"/>
+          </p:cNvSpPr>
+          <p:nvPr>
+            <p:ph type="title"/>
+          </p:nvPr>
+        </p:nvSpPr>
+        <p:spPr/>
+        <p:txBody>
+          <a:bodyPr/>
+          <a:lstStyle/>
+          <a:p>
+            <a:endParaRPr lang="en-US"/>
+          </a:p>
+        </p:txBody>
+      </p:sp>
+      <p:pic>
+        <p:nvPicPr>
+          <p:cNvPr id="5" name="Content Placeholder 4" descr="A graph with colored dots&#10;&#10;Description automatically generated">
+            <a:extLst>
+              <a:ext uri="{FF2B5EF4-FFF2-40B4-BE49-F238E27FC236}">
+                <a16:creationId xmlns:a16="http://schemas.microsoft.com/office/drawing/2014/main" id="{0539D350-52C0-0030-A2EF-71BBBAA5AC69}"/>
+              </a:ext>
+            </a:extLst>
+          </p:cNvPr>
+          <p:cNvPicPr>
+            <a:picLocks noGrp="1" noChangeAspect="1"/>
+          </p:cNvPicPr>
+          <p:nvPr>
+            <p:ph idx="1"/>
+          </p:nvPr>
+        </p:nvPicPr>
+        <p:blipFill>
+          <a:blip r:embed="rId2">
+            <a:extLst>
+              <a:ext uri="{28A0092B-C50C-407E-A947-70E740481C1C}">
+                <a14:useLocalDpi xmlns:a14="http://schemas.microsoft.com/office/drawing/2010/main" val="0"/>
+              </a:ext>
+            </a:extLst>
+          </a:blip>
+          <a:stretch>
+            <a:fillRect/>
+          </a:stretch>
+        </p:blipFill>
+        <p:spPr>
+          <a:xfrm>
+            <a:off x="952499" y="0"/>
+            <a:ext cx="10287001" cy="6858000"/>
+          </a:xfrm>
+        </p:spPr>
+      </p:pic>
+    </p:spTree>
+    <p:extLst>
+      <p:ext uri="{BB962C8B-B14F-4D97-AF65-F5344CB8AC3E}">
+        <p14:creationId xmlns:p14="http://schemas.microsoft.com/office/powerpoint/2010/main" val="1190860437"/>
+      </p:ext>
+    </p:extLst>
+  </p:cSld>
+  <p:clrMapOvr>
+    <a:masterClrMapping/>
+  </p:clrMapOvr>
+</p:sld>
+</file>
+
+<file path=ppt/slides/slide19.xml><?xml version="1.0" encoding="utf-8"?>
+<p:sld xmlns:a="http://schemas.openxmlformats.org/drawingml/2006/main" xmlns:r="http://schemas.openxmlformats.org/officeDocument/2006/relationships" xmlns:p="http://schemas.openxmlformats.org/presentationml/2006/main">
+  <p:cSld>
+    <p:spTree>
+      <p:nvGrpSpPr>
+        <p:cNvPr id="1" name="">
+          <a:extLst>
+            <a:ext uri="{FF2B5EF4-FFF2-40B4-BE49-F238E27FC236}">
+              <a16:creationId xmlns:a16="http://schemas.microsoft.com/office/drawing/2014/main" id="{48D50169-7587-2563-6CA3-4B5CE2BFB03D}"/>
+            </a:ext>
+          </a:extLst>
+        </p:cNvPr>
+        <p:cNvGrpSpPr/>
+        <p:nvPr/>
+      </p:nvGrpSpPr>
+      <p:grpSpPr>
+        <a:xfrm>
+          <a:off x="0" y="0"/>
+          <a:ext cx="0" cy="0"/>
+          <a:chOff x="0" y="0"/>
+          <a:chExt cx="0" cy="0"/>
+        </a:xfrm>
+      </p:grpSpPr>
+      <p:sp>
+        <p:nvSpPr>
+          <p:cNvPr id="4" name="Title 3">
+            <a:extLst>
+              <a:ext uri="{FF2B5EF4-FFF2-40B4-BE49-F238E27FC236}">
+                <a16:creationId xmlns:a16="http://schemas.microsoft.com/office/drawing/2014/main" id="{0E32D01E-3E55-D83D-0DEE-79A5585E0CD6}"/>
+              </a:ext>
+            </a:extLst>
+          </p:cNvPr>
+          <p:cNvSpPr>
+            <a:spLocks noGrp="1"/>
+          </p:cNvSpPr>
+          <p:nvPr>
+            <p:ph type="ctrTitle"/>
+          </p:nvPr>
+        </p:nvSpPr>
+        <p:spPr/>
+        <p:txBody>
+          <a:bodyPr/>
+          <a:lstStyle/>
+          <a:p>
+            <a:r>
+              <a:rPr lang="en-US" dirty="0"/>
+              <a:t>defenders</a:t>
+            </a:r>
+          </a:p>
+        </p:txBody>
+      </p:sp>
+      <p:sp>
+        <p:nvSpPr>
+          <p:cNvPr id="5" name="Subtitle 4">
+            <a:extLst>
+              <a:ext uri="{FF2B5EF4-FFF2-40B4-BE49-F238E27FC236}">
+                <a16:creationId xmlns:a16="http://schemas.microsoft.com/office/drawing/2014/main" id="{F58F0C82-50FD-C80D-E36A-8F957DDF9108}"/>
+              </a:ext>
+            </a:extLst>
+          </p:cNvPr>
+          <p:cNvSpPr>
+            <a:spLocks noGrp="1"/>
+          </p:cNvSpPr>
+          <p:nvPr>
+            <p:ph type="subTitle" idx="1"/>
+          </p:nvPr>
+        </p:nvSpPr>
+        <p:spPr/>
+        <p:txBody>
+          <a:bodyPr/>
+          <a:lstStyle/>
+          <a:p>
+            <a:endParaRPr lang="en-US"/>
+          </a:p>
+        </p:txBody>
+      </p:sp>
+    </p:spTree>
+    <p:extLst>
+      <p:ext uri="{BB962C8B-B14F-4D97-AF65-F5344CB8AC3E}">
+        <p14:creationId xmlns:p14="http://schemas.microsoft.com/office/powerpoint/2010/main" val="3292053593"/>
+      </p:ext>
+    </p:extLst>
+  </p:cSld>
+  <p:clrMapOvr>
+    <a:masterClrMapping/>
+  </p:clrMapOvr>
+</p:sld>
+</file>
+
 <file path=ppt/slides/slide2.xml><?xml version="1.0" encoding="utf-8"?>
 <p:sld xmlns:a="http://schemas.openxmlformats.org/drawingml/2006/main" xmlns:r="http://schemas.openxmlformats.org/officeDocument/2006/relationships" xmlns:p="http://schemas.openxmlformats.org/presentationml/2006/main">
   <p:cSld>
@@ -3915,8 +5310,12 @@
               <a:buNone/>
             </a:pPr>
             <a:r>
+              <a:rPr lang="en-US"/>
+              <a:t>research </a:t>
+            </a:r>
+            <a:r>
               <a:rPr lang="en-US" dirty="0"/>
-              <a:t>instantiating question: who would be the best option to replace Mohamed Salah next season?</a:t>
+              <a:t>question: who would be the best option to replace Mohamed Salah next season?</a:t>
             </a:r>
           </a:p>
           <a:p>
@@ -3990,6 +5389,316 @@
     <p:extLst>
       <p:ext uri="{BB962C8B-B14F-4D97-AF65-F5344CB8AC3E}">
         <p14:creationId xmlns:p14="http://schemas.microsoft.com/office/powerpoint/2010/main" val="1808146167"/>
+      </p:ext>
+    </p:extLst>
+  </p:cSld>
+  <p:clrMapOvr>
+    <a:masterClrMapping/>
+  </p:clrMapOvr>
+</p:sld>
+</file>
+
+<file path=ppt/slides/slide20.xml><?xml version="1.0" encoding="utf-8"?>
+<p:sld xmlns:a="http://schemas.openxmlformats.org/drawingml/2006/main" xmlns:r="http://schemas.openxmlformats.org/officeDocument/2006/relationships" xmlns:p="http://schemas.openxmlformats.org/presentationml/2006/main">
+  <p:cSld>
+    <p:spTree>
+      <p:nvGrpSpPr>
+        <p:cNvPr id="1" name="">
+          <a:extLst>
+            <a:ext uri="{FF2B5EF4-FFF2-40B4-BE49-F238E27FC236}">
+              <a16:creationId xmlns:a16="http://schemas.microsoft.com/office/drawing/2014/main" id="{1BF36074-649C-3D15-C25A-108D6D6D849E}"/>
+            </a:ext>
+          </a:extLst>
+        </p:cNvPr>
+        <p:cNvGrpSpPr/>
+        <p:nvPr/>
+      </p:nvGrpSpPr>
+      <p:grpSpPr>
+        <a:xfrm>
+          <a:off x="0" y="0"/>
+          <a:ext cx="0" cy="0"/>
+          <a:chOff x="0" y="0"/>
+          <a:chExt cx="0" cy="0"/>
+        </a:xfrm>
+      </p:grpSpPr>
+      <p:sp>
+        <p:nvSpPr>
+          <p:cNvPr id="2" name="Title 1">
+            <a:extLst>
+              <a:ext uri="{FF2B5EF4-FFF2-40B4-BE49-F238E27FC236}">
+                <a16:creationId xmlns:a16="http://schemas.microsoft.com/office/drawing/2014/main" id="{DC881FE4-4577-FBAC-A0C7-CF27B168F005}"/>
+              </a:ext>
+            </a:extLst>
+          </p:cNvPr>
+          <p:cNvSpPr>
+            <a:spLocks noGrp="1"/>
+          </p:cNvSpPr>
+          <p:nvPr>
+            <p:ph type="title"/>
+          </p:nvPr>
+        </p:nvSpPr>
+        <p:spPr/>
+        <p:txBody>
+          <a:bodyPr/>
+          <a:lstStyle/>
+          <a:p>
+            <a:endParaRPr lang="en-US"/>
+          </a:p>
+        </p:txBody>
+      </p:sp>
+      <p:pic>
+        <p:nvPicPr>
+          <p:cNvPr id="5" name="Content Placeholder 4" descr="A graph with many colored dots&#10;&#10;Description automatically generated with medium confidence">
+            <a:extLst>
+              <a:ext uri="{FF2B5EF4-FFF2-40B4-BE49-F238E27FC236}">
+                <a16:creationId xmlns:a16="http://schemas.microsoft.com/office/drawing/2014/main" id="{2346624A-96FD-C09B-ED00-B12C2B71EA95}"/>
+              </a:ext>
+            </a:extLst>
+          </p:cNvPr>
+          <p:cNvPicPr>
+            <a:picLocks noGrp="1" noChangeAspect="1"/>
+          </p:cNvPicPr>
+          <p:nvPr>
+            <p:ph idx="1"/>
+          </p:nvPr>
+        </p:nvPicPr>
+        <p:blipFill>
+          <a:blip r:embed="rId2">
+            <a:extLst>
+              <a:ext uri="{28A0092B-C50C-407E-A947-70E740481C1C}">
+                <a14:useLocalDpi xmlns:a14="http://schemas.microsoft.com/office/drawing/2010/main" val="0"/>
+              </a:ext>
+            </a:extLst>
+          </a:blip>
+          <a:stretch>
+            <a:fillRect/>
+          </a:stretch>
+        </p:blipFill>
+        <p:spPr>
+          <a:xfrm>
+            <a:off x="952499" y="0"/>
+            <a:ext cx="10287001" cy="6858000"/>
+          </a:xfrm>
+        </p:spPr>
+      </p:pic>
+    </p:spTree>
+    <p:extLst>
+      <p:ext uri="{BB962C8B-B14F-4D97-AF65-F5344CB8AC3E}">
+        <p14:creationId xmlns:p14="http://schemas.microsoft.com/office/powerpoint/2010/main" val="1958594030"/>
+      </p:ext>
+    </p:extLst>
+  </p:cSld>
+  <p:clrMapOvr>
+    <a:masterClrMapping/>
+  </p:clrMapOvr>
+</p:sld>
+</file>
+
+<file path=ppt/slides/slide21.xml><?xml version="1.0" encoding="utf-8"?>
+<p:sld xmlns:a="http://schemas.openxmlformats.org/drawingml/2006/main" xmlns:r="http://schemas.openxmlformats.org/officeDocument/2006/relationships" xmlns:p="http://schemas.openxmlformats.org/presentationml/2006/main">
+  <p:cSld>
+    <p:spTree>
+      <p:nvGrpSpPr>
+        <p:cNvPr id="1" name="">
+          <a:extLst>
+            <a:ext uri="{FF2B5EF4-FFF2-40B4-BE49-F238E27FC236}">
+              <a16:creationId xmlns:a16="http://schemas.microsoft.com/office/drawing/2014/main" id="{0E7D5BA7-AD33-291B-E878-E85A3B28BB78}"/>
+            </a:ext>
+          </a:extLst>
+        </p:cNvPr>
+        <p:cNvGrpSpPr/>
+        <p:nvPr/>
+      </p:nvGrpSpPr>
+      <p:grpSpPr>
+        <a:xfrm>
+          <a:off x="0" y="0"/>
+          <a:ext cx="0" cy="0"/>
+          <a:chOff x="0" y="0"/>
+          <a:chExt cx="0" cy="0"/>
+        </a:xfrm>
+      </p:grpSpPr>
+      <p:sp>
+        <p:nvSpPr>
+          <p:cNvPr id="2" name="Title 1">
+            <a:extLst>
+              <a:ext uri="{FF2B5EF4-FFF2-40B4-BE49-F238E27FC236}">
+                <a16:creationId xmlns:a16="http://schemas.microsoft.com/office/drawing/2014/main" id="{4B2169E1-09D2-CDA3-8C34-D8ECD87551C0}"/>
+              </a:ext>
+            </a:extLst>
+          </p:cNvPr>
+          <p:cNvSpPr>
+            <a:spLocks noGrp="1"/>
+          </p:cNvSpPr>
+          <p:nvPr>
+            <p:ph type="title"/>
+          </p:nvPr>
+        </p:nvSpPr>
+        <p:spPr/>
+        <p:txBody>
+          <a:bodyPr/>
+          <a:lstStyle/>
+          <a:p>
+            <a:endParaRPr lang="en-US"/>
+          </a:p>
+        </p:txBody>
+      </p:sp>
+      <p:pic>
+        <p:nvPicPr>
+          <p:cNvPr id="5" name="Content Placeholder 4" descr="A graph with many colored dots&#10;&#10;Description automatically generated">
+            <a:extLst>
+              <a:ext uri="{FF2B5EF4-FFF2-40B4-BE49-F238E27FC236}">
+                <a16:creationId xmlns:a16="http://schemas.microsoft.com/office/drawing/2014/main" id="{EC3F4037-1DE4-64C1-27BA-EE618D6425AF}"/>
+              </a:ext>
+            </a:extLst>
+          </p:cNvPr>
+          <p:cNvPicPr>
+            <a:picLocks noGrp="1" noChangeAspect="1"/>
+          </p:cNvPicPr>
+          <p:nvPr>
+            <p:ph idx="1"/>
+          </p:nvPr>
+        </p:nvPicPr>
+        <p:blipFill>
+          <a:blip r:embed="rId2">
+            <a:extLst>
+              <a:ext uri="{28A0092B-C50C-407E-A947-70E740481C1C}">
+                <a14:useLocalDpi xmlns:a14="http://schemas.microsoft.com/office/drawing/2010/main" val="0"/>
+              </a:ext>
+            </a:extLst>
+          </a:blip>
+          <a:stretch>
+            <a:fillRect/>
+          </a:stretch>
+        </p:blipFill>
+        <p:spPr>
+          <a:xfrm>
+            <a:off x="952499" y="0"/>
+            <a:ext cx="10287001" cy="6858000"/>
+          </a:xfrm>
+        </p:spPr>
+      </p:pic>
+    </p:spTree>
+    <p:extLst>
+      <p:ext uri="{BB962C8B-B14F-4D97-AF65-F5344CB8AC3E}">
+        <p14:creationId xmlns:p14="http://schemas.microsoft.com/office/powerpoint/2010/main" val="3838532362"/>
+      </p:ext>
+    </p:extLst>
+  </p:cSld>
+  <p:clrMapOvr>
+    <a:masterClrMapping/>
+  </p:clrMapOvr>
+</p:sld>
+</file>
+
+<file path=ppt/slides/slide22.xml><?xml version="1.0" encoding="utf-8"?>
+<p:sld xmlns:a="http://schemas.openxmlformats.org/drawingml/2006/main" xmlns:r="http://schemas.openxmlformats.org/officeDocument/2006/relationships" xmlns:p="http://schemas.openxmlformats.org/presentationml/2006/main">
+  <p:cSld>
+    <p:spTree>
+      <p:nvGrpSpPr>
+        <p:cNvPr id="1" name=""/>
+        <p:cNvGrpSpPr/>
+        <p:nvPr/>
+      </p:nvGrpSpPr>
+      <p:grpSpPr>
+        <a:xfrm>
+          <a:off x="0" y="0"/>
+          <a:ext cx="0" cy="0"/>
+          <a:chOff x="0" y="0"/>
+          <a:chExt cx="0" cy="0"/>
+        </a:xfrm>
+      </p:grpSpPr>
+      <p:sp>
+        <p:nvSpPr>
+          <p:cNvPr id="2" name="Title 1">
+            <a:extLst>
+              <a:ext uri="{FF2B5EF4-FFF2-40B4-BE49-F238E27FC236}">
+                <a16:creationId xmlns:a16="http://schemas.microsoft.com/office/drawing/2014/main" id="{96CF0AC6-C8E8-6F51-254C-B15297159727}"/>
+              </a:ext>
+            </a:extLst>
+          </p:cNvPr>
+          <p:cNvSpPr>
+            <a:spLocks noGrp="1"/>
+          </p:cNvSpPr>
+          <p:nvPr>
+            <p:ph type="title"/>
+          </p:nvPr>
+        </p:nvSpPr>
+        <p:spPr/>
+        <p:txBody>
+          <a:bodyPr/>
+          <a:lstStyle/>
+          <a:p>
+            <a:r>
+              <a:rPr lang="en-US" dirty="0"/>
+              <a:t>next steps</a:t>
+            </a:r>
+          </a:p>
+        </p:txBody>
+      </p:sp>
+      <p:sp>
+        <p:nvSpPr>
+          <p:cNvPr id="3" name="Content Placeholder 2">
+            <a:extLst>
+              <a:ext uri="{FF2B5EF4-FFF2-40B4-BE49-F238E27FC236}">
+                <a16:creationId xmlns:a16="http://schemas.microsoft.com/office/drawing/2014/main" id="{CDA9B163-5943-0FBA-215B-B3239BD6C342}"/>
+              </a:ext>
+            </a:extLst>
+          </p:cNvPr>
+          <p:cNvSpPr>
+            <a:spLocks noGrp="1"/>
+          </p:cNvSpPr>
+          <p:nvPr>
+            <p:ph idx="1"/>
+          </p:nvPr>
+        </p:nvSpPr>
+        <p:spPr/>
+        <p:txBody>
+          <a:bodyPr/>
+          <a:lstStyle/>
+          <a:p>
+            <a:pPr>
+              <a:buFontTx/>
+              <a:buChar char="-"/>
+            </a:pPr>
+            <a:r>
+              <a:rPr lang="en-US" dirty="0"/>
+              <a:t>minimizing the number of features</a:t>
+            </a:r>
+          </a:p>
+          <a:p>
+            <a:pPr>
+              <a:buFontTx/>
+              <a:buChar char="-"/>
+            </a:pPr>
+            <a:r>
+              <a:rPr lang="en-US" dirty="0"/>
+              <a:t>formalizing similarity (</a:t>
+            </a:r>
+            <a:r>
+              <a:rPr lang="en-US" dirty="0" err="1"/>
+              <a:t>e.g</a:t>
+            </a:r>
+            <a:r>
+              <a:rPr lang="en-US" dirty="0"/>
+              <a:t> Trent vs KDB)</a:t>
+            </a:r>
+          </a:p>
+          <a:p>
+            <a:pPr>
+              <a:buFontTx/>
+              <a:buChar char="-"/>
+            </a:pPr>
+            <a:r>
+              <a:rPr lang="en-US" dirty="0"/>
+              <a:t>predicting the future season. </a:t>
+            </a:r>
+          </a:p>
+        </p:txBody>
+      </p:sp>
+    </p:spTree>
+    <p:extLst>
+      <p:ext uri="{BB962C8B-B14F-4D97-AF65-F5344CB8AC3E}">
+        <p14:creationId xmlns:p14="http://schemas.microsoft.com/office/powerpoint/2010/main" val="2758596383"/>
       </p:ext>
     </p:extLst>
   </p:cSld>
@@ -4916,7 +6625,7 @@
           <p:cNvPr id="2" name="Title 1">
             <a:extLst>
               <a:ext uri="{FF2B5EF4-FFF2-40B4-BE49-F238E27FC236}">
-                <a16:creationId xmlns:a16="http://schemas.microsoft.com/office/drawing/2014/main" id="{96CF0AC6-C8E8-6F51-254C-B15297159727}"/>
+                <a16:creationId xmlns:a16="http://schemas.microsoft.com/office/drawing/2014/main" id="{6FAA0632-5A9D-53BD-33B6-2B5493235AAD}"/>
               </a:ext>
             </a:extLst>
           </p:cNvPr>
@@ -4932,75 +6641,157 @@
           <a:bodyPr/>
           <a:lstStyle/>
           <a:p>
-            <a:r>
-              <a:rPr lang="en-US" dirty="0"/>
-              <a:t>next steps</a:t>
-            </a:r>
-          </a:p>
-        </p:txBody>
-      </p:sp>
-      <p:sp>
-        <p:nvSpPr>
-          <p:cNvPr id="3" name="Content Placeholder 2">
-            <a:extLst>
-              <a:ext uri="{FF2B5EF4-FFF2-40B4-BE49-F238E27FC236}">
-                <a16:creationId xmlns:a16="http://schemas.microsoft.com/office/drawing/2014/main" id="{CDA9B163-5943-0FBA-215B-B3239BD6C342}"/>
-              </a:ext>
-            </a:extLst>
-          </p:cNvPr>
-          <p:cNvSpPr>
-            <a:spLocks noGrp="1"/>
-          </p:cNvSpPr>
+            <a:endParaRPr lang="en-US"/>
+          </a:p>
+        </p:txBody>
+      </p:sp>
+      <p:pic>
+        <p:nvPicPr>
+          <p:cNvPr id="16" name="Content Placeholder 15">
+            <a:extLst>
+              <a:ext uri="{FF2B5EF4-FFF2-40B4-BE49-F238E27FC236}">
+                <a16:creationId xmlns:a16="http://schemas.microsoft.com/office/drawing/2014/main" id="{01570677-8C1A-F915-580C-F841CF997E5E}"/>
+              </a:ext>
+            </a:extLst>
+          </p:cNvPr>
+          <p:cNvPicPr>
+            <a:picLocks noGrp="1" noChangeAspect="1"/>
+          </p:cNvPicPr>
           <p:nvPr>
             <p:ph idx="1"/>
           </p:nvPr>
-        </p:nvSpPr>
-        <p:spPr/>
-        <p:txBody>
-          <a:bodyPr/>
-          <a:lstStyle/>
-          <a:p>
-            <a:pPr>
-              <a:buFontTx/>
-              <a:buChar char="-"/>
-            </a:pPr>
-            <a:r>
-              <a:rPr lang="en-US" dirty="0"/>
-              <a:t>formalizing similarity (</a:t>
-            </a:r>
-            <a:r>
-              <a:rPr lang="en-US" dirty="0" err="1"/>
-              <a:t>e.g</a:t>
-            </a:r>
-            <a:r>
-              <a:rPr lang="en-US" dirty="0"/>
-              <a:t> Trent vs KDB)</a:t>
-            </a:r>
-          </a:p>
-          <a:p>
-            <a:pPr>
-              <a:buFontTx/>
-              <a:buChar char="-"/>
-            </a:pPr>
-            <a:r>
-              <a:rPr lang="en-US" dirty="0"/>
-              <a:t>p</a:t>
-            </a:r>
-            <a:r>
-              <a:rPr lang="en-US"/>
-              <a:t>redicting </a:t>
-            </a:r>
-            <a:r>
-              <a:rPr lang="en-US" dirty="0"/>
-              <a:t>the future season. </a:t>
-            </a:r>
-          </a:p>
-        </p:txBody>
-      </p:sp>
+        </p:nvPicPr>
+        <p:blipFill>
+          <a:blip r:embed="rId2"/>
+          <a:stretch>
+            <a:fillRect/>
+          </a:stretch>
+        </p:blipFill>
+        <p:spPr>
+          <a:xfrm>
+            <a:off x="1585287" y="297570"/>
+            <a:ext cx="9021426" cy="6262859"/>
+          </a:xfrm>
+        </p:spPr>
+      </p:pic>
+      <p:pic>
+        <p:nvPicPr>
+          <p:cNvPr id="18" name="Picture 17">
+            <a:extLst>
+              <a:ext uri="{FF2B5EF4-FFF2-40B4-BE49-F238E27FC236}">
+                <a16:creationId xmlns:a16="http://schemas.microsoft.com/office/drawing/2014/main" id="{C42EFE5D-398B-4A04-829B-F9C901C0D22D}"/>
+              </a:ext>
+            </a:extLst>
+          </p:cNvPr>
+          <p:cNvPicPr>
+            <a:picLocks noChangeAspect="1"/>
+          </p:cNvPicPr>
+          <p:nvPr/>
+        </p:nvPicPr>
+        <p:blipFill>
+          <a:blip r:embed="rId3"/>
+          <a:stretch>
+            <a:fillRect/>
+          </a:stretch>
+        </p:blipFill>
+        <p:spPr>
+          <a:xfrm>
+            <a:off x="1231065" y="0"/>
+            <a:ext cx="9729870" cy="6858000"/>
+          </a:xfrm>
+          <a:prstGeom prst="rect">
+            <a:avLst/>
+          </a:prstGeom>
+        </p:spPr>
+      </p:pic>
     </p:spTree>
     <p:extLst>
       <p:ext uri="{BB962C8B-B14F-4D97-AF65-F5344CB8AC3E}">
-        <p14:creationId xmlns:p14="http://schemas.microsoft.com/office/powerpoint/2010/main" val="2758596383"/>
+        <p14:creationId xmlns:p14="http://schemas.microsoft.com/office/powerpoint/2010/main" val="1405563612"/>
+      </p:ext>
+    </p:extLst>
+  </p:cSld>
+  <p:clrMapOvr>
+    <a:masterClrMapping/>
+  </p:clrMapOvr>
+</p:sld>
+</file>
+
+<file path=ppt/slides/slide9.xml><?xml version="1.0" encoding="utf-8"?>
+<p:sld xmlns:a="http://schemas.openxmlformats.org/drawingml/2006/main" xmlns:r="http://schemas.openxmlformats.org/officeDocument/2006/relationships" xmlns:p="http://schemas.openxmlformats.org/presentationml/2006/main">
+  <p:cSld>
+    <p:spTree>
+      <p:nvGrpSpPr>
+        <p:cNvPr id="1" name=""/>
+        <p:cNvGrpSpPr/>
+        <p:nvPr/>
+      </p:nvGrpSpPr>
+      <p:grpSpPr>
+        <a:xfrm>
+          <a:off x="0" y="0"/>
+          <a:ext cx="0" cy="0"/>
+          <a:chOff x="0" y="0"/>
+          <a:chExt cx="0" cy="0"/>
+        </a:xfrm>
+      </p:grpSpPr>
+      <p:sp>
+        <p:nvSpPr>
+          <p:cNvPr id="4" name="Title 3">
+            <a:extLst>
+              <a:ext uri="{FF2B5EF4-FFF2-40B4-BE49-F238E27FC236}">
+                <a16:creationId xmlns:a16="http://schemas.microsoft.com/office/drawing/2014/main" id="{01207D05-F033-CE19-61F3-133FD65A8F15}"/>
+              </a:ext>
+            </a:extLst>
+          </p:cNvPr>
+          <p:cNvSpPr>
+            <a:spLocks noGrp="1"/>
+          </p:cNvSpPr>
+          <p:nvPr>
+            <p:ph type="ctrTitle"/>
+          </p:nvPr>
+        </p:nvSpPr>
+        <p:spPr/>
+        <p:txBody>
+          <a:bodyPr/>
+          <a:lstStyle/>
+          <a:p>
+            <a:r>
+              <a:rPr lang="en-US"/>
+              <a:t>forwards</a:t>
+            </a:r>
+            <a:endParaRPr lang="en-US" dirty="0"/>
+          </a:p>
+        </p:txBody>
+      </p:sp>
+      <p:sp>
+        <p:nvSpPr>
+          <p:cNvPr id="5" name="Subtitle 4">
+            <a:extLst>
+              <a:ext uri="{FF2B5EF4-FFF2-40B4-BE49-F238E27FC236}">
+                <a16:creationId xmlns:a16="http://schemas.microsoft.com/office/drawing/2014/main" id="{F186CEC1-07B2-3085-56AC-42A3ADB0621A}"/>
+              </a:ext>
+            </a:extLst>
+          </p:cNvPr>
+          <p:cNvSpPr>
+            <a:spLocks noGrp="1"/>
+          </p:cNvSpPr>
+          <p:nvPr>
+            <p:ph type="subTitle" idx="1"/>
+          </p:nvPr>
+        </p:nvSpPr>
+        <p:spPr/>
+        <p:txBody>
+          <a:bodyPr/>
+          <a:lstStyle/>
+          <a:p>
+            <a:endParaRPr lang="en-US"/>
+          </a:p>
+        </p:txBody>
+      </p:sp>
+    </p:spTree>
+    <p:extLst>
+      <p:ext uri="{BB962C8B-B14F-4D97-AF65-F5344CB8AC3E}">
+        <p14:creationId xmlns:p14="http://schemas.microsoft.com/office/powerpoint/2010/main" val="1941129471"/>
       </p:ext>
     </p:extLst>
   </p:cSld>

</xml_diff>